<commit_message>
added pics to powerpoint
</commit_message>
<xml_diff>
--- a/GameCareer_Microsoft.pptx
+++ b/GameCareer_Microsoft.pptx
@@ -2,12 +2,12 @@
 <file path=ppt/presentation.xml><?xml version="1.0" encoding="utf-8"?>
 <p:presentation xmlns:a="http://schemas.openxmlformats.org/drawingml/2006/main" xmlns:r="http://schemas.openxmlformats.org/officeDocument/2006/relationships" xmlns:p="http://schemas.openxmlformats.org/presentationml/2006/main" saveSubsetFonts="1">
   <p:sldMasterIdLst>
-    <p:sldMasterId id="2147483648" r:id="rId1"/>
+    <p:sldMasterId id="2147483672" r:id="rId1"/>
   </p:sldMasterIdLst>
   <p:sldIdLst>
     <p:sldId id="256" r:id="rId2"/>
     <p:sldId id="257" r:id="rId3"/>
-    <p:sldId id="258" r:id="rId4"/>
+    <p:sldId id="262" r:id="rId4"/>
     <p:sldId id="259" r:id="rId5"/>
     <p:sldId id="260" r:id="rId6"/>
     <p:sldId id="261" r:id="rId7"/>
@@ -109,11 +109,16 @@
       </a:defRPr>
     </a:lvl9pPr>
   </p:defaultTextStyle>
+  <p:extLst>
+    <p:ext uri="{EFAFB233-063F-42B5-8137-9DF3F51BA10A}">
+      <p15:sldGuideLst xmlns:p15="http://schemas.microsoft.com/office/powerpoint/2012/main"/>
+    </p:ext>
+  </p:extLst>
 </p:presentation>
 </file>
 
 <file path=ppt/slideLayouts/slideLayout1.xml><?xml version="1.0" encoding="utf-8"?>
-<p:sldLayout xmlns:a="http://schemas.openxmlformats.org/drawingml/2006/main" xmlns:r="http://schemas.openxmlformats.org/officeDocument/2006/relationships" xmlns:p="http://schemas.openxmlformats.org/presentationml/2006/main" type="title" preserve="1">
+<p:sldLayout xmlns:a="http://schemas.openxmlformats.org/drawingml/2006/main" xmlns:r="http://schemas.openxmlformats.org/officeDocument/2006/relationships" xmlns:p="http://schemas.openxmlformats.org/presentationml/2006/main" showMasterSp="0" type="title" preserve="1">
   <p:cSld name="Title Slide">
     <p:spTree>
       <p:nvGrpSpPr>
@@ -131,25 +136,113 @@
       </p:grpSpPr>
       <p:sp>
         <p:nvSpPr>
-          <p:cNvPr id="2" name="Title 1"/>
-          <p:cNvSpPr>
-            <a:spLocks noGrp="1"/>
-          </p:cNvSpPr>
-          <p:nvPr>
-            <p:ph type="ctrTitle"/>
-          </p:nvPr>
+          <p:cNvPr id="7" name="Rectangle 6"/>
+          <p:cNvSpPr/>
+          <p:nvPr/>
         </p:nvSpPr>
         <p:spPr>
           <a:xfrm>
-            <a:off x="1524000" y="1122363"/>
-            <a:ext cx="9144000" cy="2387600"/>
+            <a:off x="1" y="6400800"/>
+            <a:ext cx="12192000" cy="457200"/>
+          </a:xfrm>
+          <a:prstGeom prst="rect">
+            <a:avLst/>
+          </a:prstGeom>
+          <a:solidFill>
+            <a:schemeClr val="accent2"/>
+          </a:solidFill>
+          <a:ln>
+            <a:noFill/>
+          </a:ln>
+        </p:spPr>
+        <p:style>
+          <a:lnRef idx="2">
+            <a:schemeClr val="accent1">
+              <a:shade val="50000"/>
+            </a:schemeClr>
+          </a:lnRef>
+          <a:fillRef idx="1">
+            <a:schemeClr val="accent1"/>
+          </a:fillRef>
+          <a:effectRef idx="0">
+            <a:schemeClr val="accent1"/>
+          </a:effectRef>
+          <a:fontRef idx="minor">
+            <a:schemeClr val="lt1"/>
+          </a:fontRef>
+        </p:style>
+      </p:sp>
+      <p:sp>
+        <p:nvSpPr>
+          <p:cNvPr id="8" name="Rectangle 7"/>
+          <p:cNvSpPr/>
+          <p:nvPr/>
+        </p:nvSpPr>
+        <p:spPr>
+          <a:xfrm>
+            <a:off x="1" y="6334316"/>
+            <a:ext cx="12192000" cy="66484"/>
+          </a:xfrm>
+          <a:prstGeom prst="rect">
+            <a:avLst/>
+          </a:prstGeom>
+          <a:solidFill>
+            <a:schemeClr val="accent1"/>
+          </a:solidFill>
+          <a:ln>
+            <a:noFill/>
+          </a:ln>
+        </p:spPr>
+        <p:style>
+          <a:lnRef idx="2">
+            <a:schemeClr val="accent1">
+              <a:shade val="50000"/>
+            </a:schemeClr>
+          </a:lnRef>
+          <a:fillRef idx="1">
+            <a:schemeClr val="accent1"/>
+          </a:fillRef>
+          <a:effectRef idx="0">
+            <a:schemeClr val="accent1"/>
+          </a:effectRef>
+          <a:fontRef idx="minor">
+            <a:schemeClr val="lt1"/>
+          </a:fontRef>
+        </p:style>
+      </p:sp>
+      <p:sp>
+        <p:nvSpPr>
+          <p:cNvPr id="2" name="Title 1"/>
+          <p:cNvSpPr>
+            <a:spLocks noGrp="1"/>
+          </p:cNvSpPr>
+          <p:nvPr>
+            <p:ph type="ctrTitle"/>
+          </p:nvPr>
+        </p:nvSpPr>
+        <p:spPr>
+          <a:xfrm>
+            <a:off x="1097280" y="758952"/>
+            <a:ext cx="10058400" cy="3566160"/>
           </a:xfrm>
         </p:spPr>
         <p:txBody>
-          <a:bodyPr anchor="b"/>
+          <a:bodyPr anchor="b">
+            <a:normAutofit/>
+          </a:bodyPr>
           <a:lstStyle>
-            <a:lvl1pPr algn="ctr">
-              <a:defRPr sz="6000"/>
+            <a:lvl1pPr algn="l">
+              <a:lnSpc>
+                <a:spcPct val="85000"/>
+              </a:lnSpc>
+              <a:defRPr sz="8000" spc="-50" baseline="0">
+                <a:solidFill>
+                  <a:schemeClr val="tx1">
+                    <a:lumMod val="85000"/>
+                    <a:lumOff val="15000"/>
+                  </a:schemeClr>
+                </a:solidFill>
+              </a:defRPr>
             </a:lvl1pPr>
           </a:lstStyle>
           <a:p>
@@ -157,7 +250,7 @@
               <a:rPr lang="en-US" smtClean="0"/>
               <a:t>Click to edit Master title style</a:t>
             </a:r>
-            <a:endParaRPr lang="en-US"/>
+            <a:endParaRPr lang="en-US" dirty="0"/>
           </a:p>
         </p:txBody>
       </p:sp>
@@ -173,48 +266,55 @@
         </p:nvSpPr>
         <p:spPr>
           <a:xfrm>
-            <a:off x="1524000" y="3602038"/>
-            <a:ext cx="9144000" cy="1655762"/>
+            <a:off x="1100051" y="4455621"/>
+            <a:ext cx="10058400" cy="1143000"/>
           </a:xfrm>
         </p:spPr>
         <p:txBody>
-          <a:bodyPr/>
+          <a:bodyPr lIns="91440" rIns="91440">
+            <a:normAutofit/>
+          </a:bodyPr>
           <a:lstStyle>
-            <a:lvl1pPr marL="0" indent="0" algn="ctr">
-              <a:buNone/>
-              <a:defRPr sz="2400"/>
+            <a:lvl1pPr marL="0" indent="0" algn="l">
+              <a:buNone/>
+              <a:defRPr sz="2400" cap="all" spc="200" baseline="0">
+                <a:solidFill>
+                  <a:schemeClr val="tx2"/>
+                </a:solidFill>
+                <a:latin typeface="+mj-lt"/>
+              </a:defRPr>
             </a:lvl1pPr>
             <a:lvl2pPr marL="457200" indent="0" algn="ctr">
               <a:buNone/>
-              <a:defRPr sz="2000"/>
+              <a:defRPr sz="2400"/>
             </a:lvl2pPr>
             <a:lvl3pPr marL="914400" indent="0" algn="ctr">
               <a:buNone/>
-              <a:defRPr sz="1800"/>
+              <a:defRPr sz="2400"/>
             </a:lvl3pPr>
             <a:lvl4pPr marL="1371600" indent="0" algn="ctr">
               <a:buNone/>
-              <a:defRPr sz="1600"/>
+              <a:defRPr sz="2000"/>
             </a:lvl4pPr>
             <a:lvl5pPr marL="1828800" indent="0" algn="ctr">
               <a:buNone/>
-              <a:defRPr sz="1600"/>
+              <a:defRPr sz="2000"/>
             </a:lvl5pPr>
             <a:lvl6pPr marL="2286000" indent="0" algn="ctr">
               <a:buNone/>
-              <a:defRPr sz="1600"/>
+              <a:defRPr sz="2000"/>
             </a:lvl6pPr>
             <a:lvl7pPr marL="2743200" indent="0" algn="ctr">
               <a:buNone/>
-              <a:defRPr sz="1600"/>
+              <a:defRPr sz="2000"/>
             </a:lvl7pPr>
             <a:lvl8pPr marL="3200400" indent="0" algn="ctr">
               <a:buNone/>
-              <a:defRPr sz="1600"/>
+              <a:defRPr sz="2000"/>
             </a:lvl8pPr>
             <a:lvl9pPr marL="3657600" indent="0" algn="ctr">
               <a:buNone/>
-              <a:defRPr sz="1600"/>
+              <a:defRPr sz="2000"/>
             </a:lvl9pPr>
           </a:lstStyle>
           <a:p>
@@ -222,7 +322,7 @@
               <a:rPr lang="en-US" smtClean="0"/>
               <a:t>Click to edit Master subtitle style</a:t>
             </a:r>
-            <a:endParaRPr lang="en-US"/>
+            <a:endParaRPr lang="en-US" dirty="0"/>
           </a:p>
         </p:txBody>
       </p:sp>
@@ -243,7 +343,7 @@
           <a:p>
             <a:fld id="{C4D78F53-A023-4DBB-876D-99733EBAC764}" type="datetimeFigureOut">
               <a:rPr lang="en-US" smtClean="0"/>
-              <a:t>11/18/2019</a:t>
+              <a:t>11/19/2019</a:t>
             </a:fld>
             <a:endParaRPr lang="en-US"/>
           </a:p>
@@ -291,10 +391,48 @@
           </a:p>
         </p:txBody>
       </p:sp>
+      <p:cxnSp>
+        <p:nvCxnSpPr>
+          <p:cNvPr id="9" name="Straight Connector 8"/>
+          <p:cNvCxnSpPr/>
+          <p:nvPr/>
+        </p:nvCxnSpPr>
+        <p:spPr>
+          <a:xfrm>
+            <a:off x="1207658" y="4343400"/>
+            <a:ext cx="9875520" cy="0"/>
+          </a:xfrm>
+          <a:prstGeom prst="line">
+            <a:avLst/>
+          </a:prstGeom>
+          <a:ln w="6350">
+            <a:solidFill>
+              <a:schemeClr val="tx1">
+                <a:lumMod val="50000"/>
+                <a:lumOff val="50000"/>
+              </a:schemeClr>
+            </a:solidFill>
+          </a:ln>
+        </p:spPr>
+        <p:style>
+          <a:lnRef idx="1">
+            <a:schemeClr val="accent1"/>
+          </a:lnRef>
+          <a:fillRef idx="0">
+            <a:schemeClr val="accent1"/>
+          </a:fillRef>
+          <a:effectRef idx="0">
+            <a:schemeClr val="accent1"/>
+          </a:effectRef>
+          <a:fontRef idx="minor">
+            <a:schemeClr val="tx1"/>
+          </a:fontRef>
+        </p:style>
+      </p:cxnSp>
     </p:spTree>
     <p:extLst>
       <p:ext uri="{BB962C8B-B14F-4D97-AF65-F5344CB8AC3E}">
-        <p14:creationId xmlns:p14="http://schemas.microsoft.com/office/powerpoint/2010/main" val="2838732570"/>
+        <p14:creationId xmlns:p14="http://schemas.microsoft.com/office/powerpoint/2010/main" val="2077469690"/>
       </p:ext>
     </p:extLst>
   </p:cSld>
@@ -340,7 +478,7 @@
               <a:rPr lang="en-US" smtClean="0"/>
               <a:t>Click to edit Master title style</a:t>
             </a:r>
-            <a:endParaRPr lang="en-US"/>
+            <a:endParaRPr lang="en-US" dirty="0"/>
           </a:p>
         </p:txBody>
       </p:sp>
@@ -356,7 +494,7 @@
         </p:nvSpPr>
         <p:spPr/>
         <p:txBody>
-          <a:bodyPr vert="eaVert"/>
+          <a:bodyPr vert="eaVert" lIns="45720" tIns="0" rIns="45720" bIns="0"/>
           <a:lstStyle/>
           <a:p>
             <a:pPr lvl="0"/>
@@ -392,7 +530,7 @@
               <a:rPr lang="en-US" smtClean="0"/>
               <a:t>Fifth level</a:t>
             </a:r>
-            <a:endParaRPr lang="en-US"/>
+            <a:endParaRPr lang="en-US" dirty="0"/>
           </a:p>
         </p:txBody>
       </p:sp>
@@ -413,7 +551,7 @@
           <a:p>
             <a:fld id="{C4D78F53-A023-4DBB-876D-99733EBAC764}" type="datetimeFigureOut">
               <a:rPr lang="en-US" smtClean="0"/>
-              <a:t>11/18/2019</a:t>
+              <a:t>11/19/2019</a:t>
             </a:fld>
             <a:endParaRPr lang="en-US"/>
           </a:p>
@@ -464,7 +602,7 @@
     </p:spTree>
     <p:extLst>
       <p:ext uri="{BB962C8B-B14F-4D97-AF65-F5344CB8AC3E}">
-        <p14:creationId xmlns:p14="http://schemas.microsoft.com/office/powerpoint/2010/main" val="121923077"/>
+        <p14:creationId xmlns:p14="http://schemas.microsoft.com/office/powerpoint/2010/main" val="2522674387"/>
       </p:ext>
     </p:extLst>
   </p:cSld>
@@ -475,7 +613,7 @@
 </file>
 
 <file path=ppt/slideLayouts/slideLayout11.xml><?xml version="1.0" encoding="utf-8"?>
-<p:sldLayout xmlns:a="http://schemas.openxmlformats.org/drawingml/2006/main" xmlns:r="http://schemas.openxmlformats.org/officeDocument/2006/relationships" xmlns:p="http://schemas.openxmlformats.org/presentationml/2006/main" type="vertTitleAndTx" preserve="1">
+<p:sldLayout xmlns:a="http://schemas.openxmlformats.org/drawingml/2006/main" xmlns:r="http://schemas.openxmlformats.org/officeDocument/2006/relationships" xmlns:p="http://schemas.openxmlformats.org/presentationml/2006/main" showMasterSp="0" type="vertTitleAndTx" preserve="1">
   <p:cSld name="Vertical Title and Text">
     <p:spTree>
       <p:nvGrpSpPr>
@@ -493,18 +631,94 @@
       </p:grpSpPr>
       <p:sp>
         <p:nvSpPr>
-          <p:cNvPr id="2" name="Vertical Title 1"/>
-          <p:cNvSpPr>
-            <a:spLocks noGrp="1"/>
-          </p:cNvSpPr>
-          <p:nvPr>
-            <p:ph type="title" orient="vert"/>
-          </p:nvPr>
+          <p:cNvPr id="7" name="Rectangle 6"/>
+          <p:cNvSpPr/>
+          <p:nvPr/>
         </p:nvSpPr>
         <p:spPr>
           <a:xfrm>
-            <a:off x="8724900" y="365125"/>
-            <a:ext cx="2628900" cy="5811838"/>
+            <a:off x="3175" y="6400800"/>
+            <a:ext cx="12188825" cy="457200"/>
+          </a:xfrm>
+          <a:prstGeom prst="rect">
+            <a:avLst/>
+          </a:prstGeom>
+          <a:solidFill>
+            <a:schemeClr val="accent2"/>
+          </a:solidFill>
+          <a:ln>
+            <a:noFill/>
+          </a:ln>
+        </p:spPr>
+        <p:style>
+          <a:lnRef idx="2">
+            <a:schemeClr val="accent1">
+              <a:shade val="50000"/>
+            </a:schemeClr>
+          </a:lnRef>
+          <a:fillRef idx="1">
+            <a:schemeClr val="accent1"/>
+          </a:fillRef>
+          <a:effectRef idx="0">
+            <a:schemeClr val="accent1"/>
+          </a:effectRef>
+          <a:fontRef idx="minor">
+            <a:schemeClr val="lt1"/>
+          </a:fontRef>
+        </p:style>
+      </p:sp>
+      <p:sp>
+        <p:nvSpPr>
+          <p:cNvPr id="8" name="Rectangle 7"/>
+          <p:cNvSpPr/>
+          <p:nvPr/>
+        </p:nvSpPr>
+        <p:spPr>
+          <a:xfrm>
+            <a:off x="15" y="6334316"/>
+            <a:ext cx="12188825" cy="64008"/>
+          </a:xfrm>
+          <a:prstGeom prst="rect">
+            <a:avLst/>
+          </a:prstGeom>
+          <a:solidFill>
+            <a:schemeClr val="accent1"/>
+          </a:solidFill>
+          <a:ln>
+            <a:noFill/>
+          </a:ln>
+        </p:spPr>
+        <p:style>
+          <a:lnRef idx="2">
+            <a:schemeClr val="accent1">
+              <a:shade val="50000"/>
+            </a:schemeClr>
+          </a:lnRef>
+          <a:fillRef idx="1">
+            <a:schemeClr val="accent1"/>
+          </a:fillRef>
+          <a:effectRef idx="0">
+            <a:schemeClr val="accent1"/>
+          </a:effectRef>
+          <a:fontRef idx="minor">
+            <a:schemeClr val="lt1"/>
+          </a:fontRef>
+        </p:style>
+      </p:sp>
+      <p:sp>
+        <p:nvSpPr>
+          <p:cNvPr id="2" name="Vertical Title 1"/>
+          <p:cNvSpPr>
+            <a:spLocks noGrp="1"/>
+          </p:cNvSpPr>
+          <p:nvPr>
+            <p:ph type="title" orient="vert"/>
+          </p:nvPr>
+        </p:nvSpPr>
+        <p:spPr>
+          <a:xfrm>
+            <a:off x="8724900" y="412302"/>
+            <a:ext cx="2628900" cy="5759898"/>
           </a:xfrm>
         </p:spPr>
         <p:txBody>
@@ -515,7 +729,7 @@
               <a:rPr lang="en-US" smtClean="0"/>
               <a:t>Click to edit Master title style</a:t>
             </a:r>
-            <a:endParaRPr lang="en-US"/>
+            <a:endParaRPr lang="en-US" dirty="0"/>
           </a:p>
         </p:txBody>
       </p:sp>
@@ -531,12 +745,12 @@
         </p:nvSpPr>
         <p:spPr>
           <a:xfrm>
-            <a:off x="838200" y="365125"/>
-            <a:ext cx="7734300" cy="5811838"/>
+            <a:off x="838200" y="412302"/>
+            <a:ext cx="7734300" cy="5759898"/>
           </a:xfrm>
         </p:spPr>
         <p:txBody>
-          <a:bodyPr vert="eaVert"/>
+          <a:bodyPr vert="eaVert" lIns="45720" tIns="0" rIns="45720" bIns="0"/>
           <a:lstStyle/>
           <a:p>
             <a:pPr lvl="0"/>
@@ -572,7 +786,7 @@
               <a:rPr lang="en-US" smtClean="0"/>
               <a:t>Fifth level</a:t>
             </a:r>
-            <a:endParaRPr lang="en-US"/>
+            <a:endParaRPr lang="en-US" dirty="0"/>
           </a:p>
         </p:txBody>
       </p:sp>
@@ -593,7 +807,7 @@
           <a:p>
             <a:fld id="{C4D78F53-A023-4DBB-876D-99733EBAC764}" type="datetimeFigureOut">
               <a:rPr lang="en-US" smtClean="0"/>
-              <a:t>11/18/2019</a:t>
+              <a:t>11/19/2019</a:t>
             </a:fld>
             <a:endParaRPr lang="en-US"/>
           </a:p>
@@ -644,7 +858,7 @@
     </p:spTree>
     <p:extLst>
       <p:ext uri="{BB962C8B-B14F-4D97-AF65-F5344CB8AC3E}">
-        <p14:creationId xmlns:p14="http://schemas.microsoft.com/office/powerpoint/2010/main" val="583301545"/>
+        <p14:creationId xmlns:p14="http://schemas.microsoft.com/office/powerpoint/2010/main" val="2854256574"/>
       </p:ext>
     </p:extLst>
   </p:cSld>
@@ -690,7 +904,7 @@
               <a:rPr lang="en-US" smtClean="0"/>
               <a:t>Click to edit Master title style</a:t>
             </a:r>
-            <a:endParaRPr lang="en-US"/>
+            <a:endParaRPr lang="en-US" dirty="0"/>
           </a:p>
         </p:txBody>
       </p:sp>
@@ -742,7 +956,7 @@
               <a:rPr lang="en-US" smtClean="0"/>
               <a:t>Fifth level</a:t>
             </a:r>
-            <a:endParaRPr lang="en-US"/>
+            <a:endParaRPr lang="en-US" dirty="0"/>
           </a:p>
         </p:txBody>
       </p:sp>
@@ -763,7 +977,7 @@
           <a:p>
             <a:fld id="{C4D78F53-A023-4DBB-876D-99733EBAC764}" type="datetimeFigureOut">
               <a:rPr lang="en-US" smtClean="0"/>
-              <a:t>11/18/2019</a:t>
+              <a:t>11/19/2019</a:t>
             </a:fld>
             <a:endParaRPr lang="en-US"/>
           </a:p>
@@ -814,7 +1028,7 @@
     </p:spTree>
     <p:extLst>
       <p:ext uri="{BB962C8B-B14F-4D97-AF65-F5344CB8AC3E}">
-        <p14:creationId xmlns:p14="http://schemas.microsoft.com/office/powerpoint/2010/main" val="205286336"/>
+        <p14:creationId xmlns:p14="http://schemas.microsoft.com/office/powerpoint/2010/main" val="886081261"/>
       </p:ext>
     </p:extLst>
   </p:cSld>
@@ -825,8 +1039,16 @@
 </file>
 
 <file path=ppt/slideLayouts/slideLayout3.xml><?xml version="1.0" encoding="utf-8"?>
-<p:sldLayout xmlns:a="http://schemas.openxmlformats.org/drawingml/2006/main" xmlns:r="http://schemas.openxmlformats.org/officeDocument/2006/relationships" xmlns:p="http://schemas.openxmlformats.org/presentationml/2006/main" type="secHead" preserve="1">
+<p:sldLayout xmlns:a="http://schemas.openxmlformats.org/drawingml/2006/main" xmlns:r="http://schemas.openxmlformats.org/officeDocument/2006/relationships" xmlns:p="http://schemas.openxmlformats.org/presentationml/2006/main" showMasterSp="0" type="secHead" preserve="1">
   <p:cSld name="Section Header">
+    <p:bg>
+      <p:bgPr>
+        <a:solidFill>
+          <a:schemeClr val="bg1"/>
+        </a:solidFill>
+        <a:effectLst/>
+      </p:bgPr>
+    </p:bg>
     <p:spTree>
       <p:nvGrpSpPr>
         <p:cNvPr id="1" name=""/>
@@ -843,25 +1065,113 @@
       </p:grpSpPr>
       <p:sp>
         <p:nvSpPr>
-          <p:cNvPr id="2" name="Title 1"/>
-          <p:cNvSpPr>
-            <a:spLocks noGrp="1"/>
-          </p:cNvSpPr>
-          <p:nvPr>
-            <p:ph type="title"/>
-          </p:nvPr>
+          <p:cNvPr id="7" name="Rectangle 6"/>
+          <p:cNvSpPr/>
+          <p:nvPr/>
         </p:nvSpPr>
         <p:spPr>
           <a:xfrm>
-            <a:off x="831850" y="1709738"/>
-            <a:ext cx="10515600" cy="2852737"/>
+            <a:off x="3175" y="6400800"/>
+            <a:ext cx="12188825" cy="457200"/>
+          </a:xfrm>
+          <a:prstGeom prst="rect">
+            <a:avLst/>
+          </a:prstGeom>
+          <a:solidFill>
+            <a:schemeClr val="accent2"/>
+          </a:solidFill>
+          <a:ln>
+            <a:noFill/>
+          </a:ln>
+        </p:spPr>
+        <p:style>
+          <a:lnRef idx="2">
+            <a:schemeClr val="accent1">
+              <a:shade val="50000"/>
+            </a:schemeClr>
+          </a:lnRef>
+          <a:fillRef idx="1">
+            <a:schemeClr val="accent1"/>
+          </a:fillRef>
+          <a:effectRef idx="0">
+            <a:schemeClr val="accent1"/>
+          </a:effectRef>
+          <a:fontRef idx="minor">
+            <a:schemeClr val="lt1"/>
+          </a:fontRef>
+        </p:style>
+      </p:sp>
+      <p:sp>
+        <p:nvSpPr>
+          <p:cNvPr id="8" name="Rectangle 7"/>
+          <p:cNvSpPr/>
+          <p:nvPr/>
+        </p:nvSpPr>
+        <p:spPr>
+          <a:xfrm>
+            <a:off x="15" y="6334316"/>
+            <a:ext cx="12188825" cy="64008"/>
+          </a:xfrm>
+          <a:prstGeom prst="rect">
+            <a:avLst/>
+          </a:prstGeom>
+          <a:solidFill>
+            <a:schemeClr val="accent1"/>
+          </a:solidFill>
+          <a:ln>
+            <a:noFill/>
+          </a:ln>
+        </p:spPr>
+        <p:style>
+          <a:lnRef idx="2">
+            <a:schemeClr val="accent1">
+              <a:shade val="50000"/>
+            </a:schemeClr>
+          </a:lnRef>
+          <a:fillRef idx="1">
+            <a:schemeClr val="accent1"/>
+          </a:fillRef>
+          <a:effectRef idx="0">
+            <a:schemeClr val="accent1"/>
+          </a:effectRef>
+          <a:fontRef idx="minor">
+            <a:schemeClr val="lt1"/>
+          </a:fontRef>
+        </p:style>
+      </p:sp>
+      <p:sp>
+        <p:nvSpPr>
+          <p:cNvPr id="2" name="Title 1"/>
+          <p:cNvSpPr>
+            <a:spLocks noGrp="1"/>
+          </p:cNvSpPr>
+          <p:nvPr>
+            <p:ph type="title"/>
+          </p:nvPr>
+        </p:nvSpPr>
+        <p:spPr>
+          <a:xfrm>
+            <a:off x="1097280" y="758952"/>
+            <a:ext cx="10058400" cy="3566160"/>
           </a:xfrm>
         </p:spPr>
         <p:txBody>
-          <a:bodyPr anchor="b"/>
+          <a:bodyPr anchor="b" anchorCtr="0">
+            <a:normAutofit/>
+          </a:bodyPr>
           <a:lstStyle>
             <a:lvl1pPr>
-              <a:defRPr sz="6000"/>
+              <a:lnSpc>
+                <a:spcPct val="85000"/>
+              </a:lnSpc>
+              <a:defRPr sz="8000" b="0">
+                <a:solidFill>
+                  <a:schemeClr val="tx1">
+                    <a:lumMod val="85000"/>
+                    <a:lumOff val="15000"/>
+                  </a:schemeClr>
+                </a:solidFill>
+              </a:defRPr>
             </a:lvl1pPr>
           </a:lstStyle>
           <a:p>
@@ -869,7 +1179,7 @@
               <a:rPr lang="en-US" smtClean="0"/>
               <a:t>Click to edit Master title style</a:t>
             </a:r>
-            <a:endParaRPr lang="en-US"/>
+            <a:endParaRPr lang="en-US" dirty="0"/>
           </a:p>
         </p:txBody>
       </p:sp>
@@ -885,26 +1195,27 @@
         </p:nvSpPr>
         <p:spPr>
           <a:xfrm>
-            <a:off x="831850" y="4589463"/>
-            <a:ext cx="10515600" cy="1500187"/>
+            <a:off x="1097280" y="4453128"/>
+            <a:ext cx="10058400" cy="1143000"/>
           </a:xfrm>
         </p:spPr>
         <p:txBody>
-          <a:bodyPr/>
+          <a:bodyPr lIns="91440" rIns="91440" anchor="t" anchorCtr="0">
+            <a:normAutofit/>
+          </a:bodyPr>
           <a:lstStyle>
             <a:lvl1pPr marL="0" indent="0">
               <a:buNone/>
-              <a:defRPr sz="2400">
-                <a:solidFill>
-                  <a:schemeClr val="tx1">
-                    <a:tint val="75000"/>
-                  </a:schemeClr>
-                </a:solidFill>
+              <a:defRPr sz="2400" cap="all" spc="200" baseline="0">
+                <a:solidFill>
+                  <a:schemeClr val="tx2"/>
+                </a:solidFill>
+                <a:latin typeface="+mj-lt"/>
               </a:defRPr>
             </a:lvl1pPr>
             <a:lvl2pPr marL="457200" indent="0">
               <a:buNone/>
-              <a:defRPr sz="2000">
+              <a:defRPr sz="1800">
                 <a:solidFill>
                   <a:schemeClr val="tx1">
                     <a:tint val="75000"/>
@@ -914,7 +1225,7 @@
             </a:lvl2pPr>
             <a:lvl3pPr marL="914400" indent="0">
               <a:buNone/>
-              <a:defRPr sz="1800">
+              <a:defRPr sz="1600">
                 <a:solidFill>
                   <a:schemeClr val="tx1">
                     <a:tint val="75000"/>
@@ -924,7 +1235,7 @@
             </a:lvl3pPr>
             <a:lvl4pPr marL="1371600" indent="0">
               <a:buNone/>
-              <a:defRPr sz="1600">
+              <a:defRPr sz="1400">
                 <a:solidFill>
                   <a:schemeClr val="tx1">
                     <a:tint val="75000"/>
@@ -934,7 +1245,7 @@
             </a:lvl4pPr>
             <a:lvl5pPr marL="1828800" indent="0">
               <a:buNone/>
-              <a:defRPr sz="1600">
+              <a:defRPr sz="1400">
                 <a:solidFill>
                   <a:schemeClr val="tx1">
                     <a:tint val="75000"/>
@@ -944,7 +1255,7 @@
             </a:lvl5pPr>
             <a:lvl6pPr marL="2286000" indent="0">
               <a:buNone/>
-              <a:defRPr sz="1600">
+              <a:defRPr sz="1400">
                 <a:solidFill>
                   <a:schemeClr val="tx1">
                     <a:tint val="75000"/>
@@ -954,7 +1265,7 @@
             </a:lvl6pPr>
             <a:lvl7pPr marL="2743200" indent="0">
               <a:buNone/>
-              <a:defRPr sz="1600">
+              <a:defRPr sz="1400">
                 <a:solidFill>
                   <a:schemeClr val="tx1">
                     <a:tint val="75000"/>
@@ -964,7 +1275,7 @@
             </a:lvl7pPr>
             <a:lvl8pPr marL="3200400" indent="0">
               <a:buNone/>
-              <a:defRPr sz="1600">
+              <a:defRPr sz="1400">
                 <a:solidFill>
                   <a:schemeClr val="tx1">
                     <a:tint val="75000"/>
@@ -974,7 +1285,7 @@
             </a:lvl8pPr>
             <a:lvl9pPr marL="3657600" indent="0">
               <a:buNone/>
-              <a:defRPr sz="1600">
+              <a:defRPr sz="1400">
                 <a:solidFill>
                   <a:schemeClr val="tx1">
                     <a:tint val="75000"/>
@@ -1009,7 +1320,7 @@
           <a:p>
             <a:fld id="{C4D78F53-A023-4DBB-876D-99733EBAC764}" type="datetimeFigureOut">
               <a:rPr lang="en-US" smtClean="0"/>
-              <a:t>11/18/2019</a:t>
+              <a:t>11/19/2019</a:t>
             </a:fld>
             <a:endParaRPr lang="en-US"/>
           </a:p>
@@ -1057,10 +1368,48 @@
           </a:p>
         </p:txBody>
       </p:sp>
+      <p:cxnSp>
+        <p:nvCxnSpPr>
+          <p:cNvPr id="9" name="Straight Connector 8"/>
+          <p:cNvCxnSpPr/>
+          <p:nvPr/>
+        </p:nvCxnSpPr>
+        <p:spPr>
+          <a:xfrm>
+            <a:off x="1207658" y="4343400"/>
+            <a:ext cx="9875520" cy="0"/>
+          </a:xfrm>
+          <a:prstGeom prst="line">
+            <a:avLst/>
+          </a:prstGeom>
+          <a:ln w="6350">
+            <a:solidFill>
+              <a:schemeClr val="tx1">
+                <a:lumMod val="50000"/>
+                <a:lumOff val="50000"/>
+              </a:schemeClr>
+            </a:solidFill>
+          </a:ln>
+        </p:spPr>
+        <p:style>
+          <a:lnRef idx="1">
+            <a:schemeClr val="accent1"/>
+          </a:lnRef>
+          <a:fillRef idx="0">
+            <a:schemeClr val="accent1"/>
+          </a:fillRef>
+          <a:effectRef idx="0">
+            <a:schemeClr val="accent1"/>
+          </a:effectRef>
+          <a:fontRef idx="minor">
+            <a:schemeClr val="tx1"/>
+          </a:fontRef>
+        </p:style>
+      </p:cxnSp>
     </p:spTree>
     <p:extLst>
       <p:ext uri="{BB962C8B-B14F-4D97-AF65-F5344CB8AC3E}">
-        <p14:creationId xmlns:p14="http://schemas.microsoft.com/office/powerpoint/2010/main" val="3877799374"/>
+        <p14:creationId xmlns:p14="http://schemas.microsoft.com/office/powerpoint/2010/main" val="1807568035"/>
       </p:ext>
     </p:extLst>
   </p:cSld>
@@ -1089,98 +1438,46 @@
       </p:grpSpPr>
       <p:sp>
         <p:nvSpPr>
-          <p:cNvPr id="2" name="Title 1"/>
+          <p:cNvPr id="8" name="Title 7"/>
           <p:cNvSpPr>
             <a:spLocks noGrp="1"/>
           </p:cNvSpPr>
           <p:nvPr>
             <p:ph type="title"/>
-          </p:nvPr>
-        </p:nvSpPr>
-        <p:spPr/>
-        <p:txBody>
-          <a:bodyPr/>
-          <a:lstStyle/>
-          <a:p>
-            <a:r>
-              <a:rPr lang="en-US" smtClean="0"/>
-              <a:t>Click to edit Master title style</a:t>
-            </a:r>
-            <a:endParaRPr lang="en-US"/>
-          </a:p>
-        </p:txBody>
-      </p:sp>
-      <p:sp>
-        <p:nvSpPr>
-          <p:cNvPr id="3" name="Content Placeholder 2"/>
-          <p:cNvSpPr>
-            <a:spLocks noGrp="1"/>
-          </p:cNvSpPr>
-          <p:nvPr>
-            <p:ph sz="half" idx="1"/>
           </p:nvPr>
         </p:nvSpPr>
         <p:spPr>
           <a:xfrm>
-            <a:off x="838200" y="1825625"/>
-            <a:ext cx="5181600" cy="4351338"/>
+            <a:off x="1097280" y="286603"/>
+            <a:ext cx="10058400" cy="1450757"/>
           </a:xfrm>
         </p:spPr>
         <p:txBody>
           <a:bodyPr/>
           <a:lstStyle/>
           <a:p>
-            <a:pPr lvl="0"/>
-            <a:r>
-              <a:rPr lang="en-US" smtClean="0"/>
-              <a:t>Edit Master text styles</a:t>
-            </a:r>
-          </a:p>
-          <a:p>
-            <a:pPr lvl="1"/>
-            <a:r>
-              <a:rPr lang="en-US" smtClean="0"/>
-              <a:t>Second level</a:t>
-            </a:r>
-          </a:p>
-          <a:p>
-            <a:pPr lvl="2"/>
-            <a:r>
-              <a:rPr lang="en-US" smtClean="0"/>
-              <a:t>Third level</a:t>
-            </a:r>
-          </a:p>
-          <a:p>
-            <a:pPr lvl="3"/>
-            <a:r>
-              <a:rPr lang="en-US" smtClean="0"/>
-              <a:t>Fourth level</a:t>
-            </a:r>
-          </a:p>
-          <a:p>
-            <a:pPr lvl="4"/>
-            <a:r>
-              <a:rPr lang="en-US" smtClean="0"/>
-              <a:t>Fifth level</a:t>
-            </a:r>
-            <a:endParaRPr lang="en-US"/>
-          </a:p>
-        </p:txBody>
-      </p:sp>
-      <p:sp>
-        <p:nvSpPr>
-          <p:cNvPr id="4" name="Content Placeholder 3"/>
-          <p:cNvSpPr>
-            <a:spLocks noGrp="1"/>
-          </p:cNvSpPr>
-          <p:nvPr>
-            <p:ph sz="half" idx="2"/>
+            <a:r>
+              <a:rPr lang="en-US" smtClean="0"/>
+              <a:t>Click to edit Master title style</a:t>
+            </a:r>
+            <a:endParaRPr lang="en-US" dirty="0"/>
+          </a:p>
+        </p:txBody>
+      </p:sp>
+      <p:sp>
+        <p:nvSpPr>
+          <p:cNvPr id="3" name="Content Placeholder 2"/>
+          <p:cNvSpPr>
+            <a:spLocks noGrp="1"/>
+          </p:cNvSpPr>
+          <p:nvPr>
+            <p:ph sz="half" idx="1"/>
           </p:nvPr>
         </p:nvSpPr>
         <p:spPr>
           <a:xfrm>
-            <a:off x="6172200" y="1825625"/>
-            <a:ext cx="5181600" cy="4351338"/>
+            <a:off x="1097280" y="1845734"/>
+            <a:ext cx="4937760" cy="4023359"/>
           </a:xfrm>
         </p:spPr>
         <p:txBody>
@@ -1220,7 +1517,64 @@
               <a:rPr lang="en-US" smtClean="0"/>
               <a:t>Fifth level</a:t>
             </a:r>
-            <a:endParaRPr lang="en-US"/>
+            <a:endParaRPr lang="en-US" dirty="0"/>
+          </a:p>
+        </p:txBody>
+      </p:sp>
+      <p:sp>
+        <p:nvSpPr>
+          <p:cNvPr id="4" name="Content Placeholder 3"/>
+          <p:cNvSpPr>
+            <a:spLocks noGrp="1"/>
+          </p:cNvSpPr>
+          <p:nvPr>
+            <p:ph sz="half" idx="2"/>
+          </p:nvPr>
+        </p:nvSpPr>
+        <p:spPr>
+          <a:xfrm>
+            <a:off x="6217920" y="1845735"/>
+            <a:ext cx="4937760" cy="4023360"/>
+          </a:xfrm>
+        </p:spPr>
+        <p:txBody>
+          <a:bodyPr/>
+          <a:lstStyle/>
+          <a:p>
+            <a:pPr lvl="0"/>
+            <a:r>
+              <a:rPr lang="en-US" smtClean="0"/>
+              <a:t>Edit Master text styles</a:t>
+            </a:r>
+          </a:p>
+          <a:p>
+            <a:pPr lvl="1"/>
+            <a:r>
+              <a:rPr lang="en-US" smtClean="0"/>
+              <a:t>Second level</a:t>
+            </a:r>
+          </a:p>
+          <a:p>
+            <a:pPr lvl="2"/>
+            <a:r>
+              <a:rPr lang="en-US" smtClean="0"/>
+              <a:t>Third level</a:t>
+            </a:r>
+          </a:p>
+          <a:p>
+            <a:pPr lvl="3"/>
+            <a:r>
+              <a:rPr lang="en-US" smtClean="0"/>
+              <a:t>Fourth level</a:t>
+            </a:r>
+          </a:p>
+          <a:p>
+            <a:pPr lvl="4"/>
+            <a:r>
+              <a:rPr lang="en-US" smtClean="0"/>
+              <a:t>Fifth level</a:t>
+            </a:r>
+            <a:endParaRPr lang="en-US" dirty="0"/>
           </a:p>
         </p:txBody>
       </p:sp>
@@ -1241,7 +1595,7 @@
           <a:p>
             <a:fld id="{C4D78F53-A023-4DBB-876D-99733EBAC764}" type="datetimeFigureOut">
               <a:rPr lang="en-US" smtClean="0"/>
-              <a:t>11/18/2019</a:t>
+              <a:t>11/19/2019</a:t>
             </a:fld>
             <a:endParaRPr lang="en-US"/>
           </a:p>
@@ -1292,7 +1646,7 @@
     </p:spTree>
     <p:extLst>
       <p:ext uri="{BB962C8B-B14F-4D97-AF65-F5344CB8AC3E}">
-        <p14:creationId xmlns:p14="http://schemas.microsoft.com/office/powerpoint/2010/main" val="1320496137"/>
+        <p14:creationId xmlns:p14="http://schemas.microsoft.com/office/powerpoint/2010/main" val="1030472199"/>
       </p:ext>
     </p:extLst>
   </p:cSld>
@@ -1321,7 +1675,7 @@
       </p:grpSpPr>
       <p:sp>
         <p:nvSpPr>
-          <p:cNvPr id="2" name="Title 1"/>
+          <p:cNvPr id="10" name="Title 9"/>
           <p:cNvSpPr>
             <a:spLocks noGrp="1"/>
           </p:cNvSpPr>
@@ -1331,8 +1685,8 @@
         </p:nvSpPr>
         <p:spPr>
           <a:xfrm>
-            <a:off x="839788" y="365125"/>
-            <a:ext cx="10515600" cy="1325563"/>
+            <a:off x="1097280" y="286603"/>
+            <a:ext cx="10058400" cy="1450757"/>
           </a:xfrm>
         </p:spPr>
         <p:txBody>
@@ -1343,7 +1697,7 @@
               <a:rPr lang="en-US" smtClean="0"/>
               <a:t>Click to edit Master title style</a:t>
             </a:r>
-            <a:endParaRPr lang="en-US"/>
+            <a:endParaRPr lang="en-US" dirty="0"/>
           </a:p>
         </p:txBody>
       </p:sp>
@@ -1359,16 +1713,22 @@
         </p:nvSpPr>
         <p:spPr>
           <a:xfrm>
-            <a:off x="839788" y="1681163"/>
-            <a:ext cx="5157787" cy="823912"/>
+            <a:off x="1097280" y="1846052"/>
+            <a:ext cx="4937760" cy="736282"/>
           </a:xfrm>
         </p:spPr>
         <p:txBody>
-          <a:bodyPr anchor="b"/>
+          <a:bodyPr lIns="91440" rIns="91440" anchor="ctr">
+            <a:normAutofit/>
+          </a:bodyPr>
           <a:lstStyle>
             <a:lvl1pPr marL="0" indent="0">
               <a:buNone/>
-              <a:defRPr sz="2400" b="1"/>
+              <a:defRPr sz="2000" b="0" cap="all" baseline="0">
+                <a:solidFill>
+                  <a:schemeClr val="tx2"/>
+                </a:solidFill>
+              </a:defRPr>
             </a:lvl1pPr>
             <a:lvl2pPr marL="457200" indent="0">
               <a:buNone/>
@@ -1424,8 +1784,8 @@
         </p:nvSpPr>
         <p:spPr>
           <a:xfrm>
-            <a:off x="839788" y="2505075"/>
-            <a:ext cx="5157787" cy="3684588"/>
+            <a:off x="1097280" y="2582335"/>
+            <a:ext cx="4937760" cy="3286760"/>
           </a:xfrm>
         </p:spPr>
         <p:txBody>
@@ -1465,7 +1825,7 @@
               <a:rPr lang="en-US" smtClean="0"/>
               <a:t>Fifth level</a:t>
             </a:r>
-            <a:endParaRPr lang="en-US"/>
+            <a:endParaRPr lang="en-US" dirty="0"/>
           </a:p>
         </p:txBody>
       </p:sp>
@@ -1481,16 +1841,22 @@
         </p:nvSpPr>
         <p:spPr>
           <a:xfrm>
-            <a:off x="6172200" y="1681163"/>
-            <a:ext cx="5183188" cy="823912"/>
+            <a:off x="6217920" y="1846052"/>
+            <a:ext cx="4937760" cy="736282"/>
           </a:xfrm>
         </p:spPr>
         <p:txBody>
-          <a:bodyPr anchor="b"/>
+          <a:bodyPr lIns="91440" rIns="91440" anchor="ctr">
+            <a:normAutofit/>
+          </a:bodyPr>
           <a:lstStyle>
             <a:lvl1pPr marL="0" indent="0">
               <a:buNone/>
-              <a:defRPr sz="2400" b="1"/>
+              <a:defRPr sz="2000" b="0" cap="all" baseline="0">
+                <a:solidFill>
+                  <a:schemeClr val="tx2"/>
+                </a:solidFill>
+              </a:defRPr>
             </a:lvl1pPr>
             <a:lvl2pPr marL="457200" indent="0">
               <a:buNone/>
@@ -1546,8 +1912,8 @@
         </p:nvSpPr>
         <p:spPr>
           <a:xfrm>
-            <a:off x="6172200" y="2505075"/>
-            <a:ext cx="5183188" cy="3684588"/>
+            <a:off x="6217920" y="2582334"/>
+            <a:ext cx="4937760" cy="3286760"/>
           </a:xfrm>
         </p:spPr>
         <p:txBody>
@@ -1587,7 +1953,7 @@
               <a:rPr lang="en-US" smtClean="0"/>
               <a:t>Fifth level</a:t>
             </a:r>
-            <a:endParaRPr lang="en-US"/>
+            <a:endParaRPr lang="en-US" dirty="0"/>
           </a:p>
         </p:txBody>
       </p:sp>
@@ -1608,7 +1974,7 @@
           <a:p>
             <a:fld id="{C4D78F53-A023-4DBB-876D-99733EBAC764}" type="datetimeFigureOut">
               <a:rPr lang="en-US" smtClean="0"/>
-              <a:t>11/18/2019</a:t>
+              <a:t>11/19/2019</a:t>
             </a:fld>
             <a:endParaRPr lang="en-US"/>
           </a:p>
@@ -1659,7 +2025,7 @@
     </p:spTree>
     <p:extLst>
       <p:ext uri="{BB962C8B-B14F-4D97-AF65-F5344CB8AC3E}">
-        <p14:creationId xmlns:p14="http://schemas.microsoft.com/office/powerpoint/2010/main" val="3841741171"/>
+        <p14:creationId xmlns:p14="http://schemas.microsoft.com/office/powerpoint/2010/main" val="3310736535"/>
       </p:ext>
     </p:extLst>
   </p:cSld>
@@ -1705,7 +2071,7 @@
               <a:rPr lang="en-US" smtClean="0"/>
               <a:t>Click to edit Master title style</a:t>
             </a:r>
-            <a:endParaRPr lang="en-US"/>
+            <a:endParaRPr lang="en-US" dirty="0"/>
           </a:p>
         </p:txBody>
       </p:sp>
@@ -1726,7 +2092,7 @@
           <a:p>
             <a:fld id="{C4D78F53-A023-4DBB-876D-99733EBAC764}" type="datetimeFigureOut">
               <a:rPr lang="en-US" smtClean="0"/>
-              <a:t>11/18/2019</a:t>
+              <a:t>11/19/2019</a:t>
             </a:fld>
             <a:endParaRPr lang="en-US"/>
           </a:p>
@@ -1777,7 +2143,7 @@
     </p:spTree>
     <p:extLst>
       <p:ext uri="{BB962C8B-B14F-4D97-AF65-F5344CB8AC3E}">
-        <p14:creationId xmlns:p14="http://schemas.microsoft.com/office/powerpoint/2010/main" val="3091889572"/>
+        <p14:creationId xmlns:p14="http://schemas.microsoft.com/office/powerpoint/2010/main" val="1497887169"/>
       </p:ext>
     </p:extLst>
   </p:cSld>
@@ -1788,7 +2154,7 @@
 </file>
 
 <file path=ppt/slideLayouts/slideLayout7.xml><?xml version="1.0" encoding="utf-8"?>
-<p:sldLayout xmlns:a="http://schemas.openxmlformats.org/drawingml/2006/main" xmlns:r="http://schemas.openxmlformats.org/officeDocument/2006/relationships" xmlns:p="http://schemas.openxmlformats.org/presentationml/2006/main" type="blank" preserve="1">
+<p:sldLayout xmlns:a="http://schemas.openxmlformats.org/drawingml/2006/main" xmlns:r="http://schemas.openxmlformats.org/officeDocument/2006/relationships" xmlns:p="http://schemas.openxmlformats.org/presentationml/2006/main" showMasterSp="0" type="blank" preserve="1">
   <p:cSld name="Blank">
     <p:spTree>
       <p:nvGrpSpPr>
@@ -1806,7 +2172,83 @@
       </p:grpSpPr>
       <p:sp>
         <p:nvSpPr>
-          <p:cNvPr id="2" name="Date Placeholder 1"/>
+          <p:cNvPr id="5" name="Rectangle 4"/>
+          <p:cNvSpPr/>
+          <p:nvPr/>
+        </p:nvSpPr>
+        <p:spPr>
+          <a:xfrm>
+            <a:off x="3175" y="6400800"/>
+            <a:ext cx="12188825" cy="457200"/>
+          </a:xfrm>
+          <a:prstGeom prst="rect">
+            <a:avLst/>
+          </a:prstGeom>
+          <a:solidFill>
+            <a:schemeClr val="accent2"/>
+          </a:solidFill>
+          <a:ln>
+            <a:noFill/>
+          </a:ln>
+        </p:spPr>
+        <p:style>
+          <a:lnRef idx="2">
+            <a:schemeClr val="accent1">
+              <a:shade val="50000"/>
+            </a:schemeClr>
+          </a:lnRef>
+          <a:fillRef idx="1">
+            <a:schemeClr val="accent1"/>
+          </a:fillRef>
+          <a:effectRef idx="0">
+            <a:schemeClr val="accent1"/>
+          </a:effectRef>
+          <a:fontRef idx="minor">
+            <a:schemeClr val="lt1"/>
+          </a:fontRef>
+        </p:style>
+      </p:sp>
+      <p:sp>
+        <p:nvSpPr>
+          <p:cNvPr id="6" name="Rectangle 5"/>
+          <p:cNvSpPr/>
+          <p:nvPr/>
+        </p:nvSpPr>
+        <p:spPr>
+          <a:xfrm>
+            <a:off x="15" y="6334316"/>
+            <a:ext cx="12188825" cy="64008"/>
+          </a:xfrm>
+          <a:prstGeom prst="rect">
+            <a:avLst/>
+          </a:prstGeom>
+          <a:solidFill>
+            <a:schemeClr val="accent1"/>
+          </a:solidFill>
+          <a:ln>
+            <a:noFill/>
+          </a:ln>
+        </p:spPr>
+        <p:style>
+          <a:lnRef idx="2">
+            <a:schemeClr val="accent1">
+              <a:shade val="50000"/>
+            </a:schemeClr>
+          </a:lnRef>
+          <a:fillRef idx="1">
+            <a:schemeClr val="accent1"/>
+          </a:fillRef>
+          <a:effectRef idx="0">
+            <a:schemeClr val="accent1"/>
+          </a:effectRef>
+          <a:fontRef idx="minor">
+            <a:schemeClr val="lt1"/>
+          </a:fontRef>
+        </p:style>
+      </p:sp>
+      <p:sp>
+        <p:nvSpPr>
+          <p:cNvPr id="7" name="Date Placeholder 6"/>
           <p:cNvSpPr>
             <a:spLocks noGrp="1"/>
           </p:cNvSpPr>
@@ -1821,7 +2263,7 @@
           <a:p>
             <a:fld id="{C4D78F53-A023-4DBB-876D-99733EBAC764}" type="datetimeFigureOut">
               <a:rPr lang="en-US" smtClean="0"/>
-              <a:t>11/18/2019</a:t>
+              <a:t>11/19/2019</a:t>
             </a:fld>
             <a:endParaRPr lang="en-US"/>
           </a:p>
@@ -1829,7 +2271,7 @@
       </p:sp>
       <p:sp>
         <p:nvSpPr>
-          <p:cNvPr id="3" name="Footer Placeholder 2"/>
+          <p:cNvPr id="8" name="Footer Placeholder 7"/>
           <p:cNvSpPr>
             <a:spLocks noGrp="1"/>
           </p:cNvSpPr>
@@ -1840,7 +2282,15 @@
         <p:spPr/>
         <p:txBody>
           <a:bodyPr/>
-          <a:lstStyle/>
+          <a:lstStyle>
+            <a:lvl1pPr>
+              <a:defRPr>
+                <a:solidFill>
+                  <a:srgbClr val="FFFFFF"/>
+                </a:solidFill>
+              </a:defRPr>
+            </a:lvl1pPr>
+          </a:lstStyle>
           <a:p>
             <a:endParaRPr lang="en-US"/>
           </a:p>
@@ -1848,7 +2298,7 @@
       </p:sp>
       <p:sp>
         <p:nvSpPr>
-          <p:cNvPr id="4" name="Slide Number Placeholder 3"/>
+          <p:cNvPr id="9" name="Slide Number Placeholder 8"/>
           <p:cNvSpPr>
             <a:spLocks noGrp="1"/>
           </p:cNvSpPr>
@@ -1872,7 +2322,7 @@
     </p:spTree>
     <p:extLst>
       <p:ext uri="{BB962C8B-B14F-4D97-AF65-F5344CB8AC3E}">
-        <p14:creationId xmlns:p14="http://schemas.microsoft.com/office/powerpoint/2010/main" val="3233288641"/>
+        <p14:creationId xmlns:p14="http://schemas.microsoft.com/office/powerpoint/2010/main" val="3879505359"/>
       </p:ext>
     </p:extLst>
   </p:cSld>
@@ -1883,7 +2333,7 @@
 </file>
 
 <file path=ppt/slideLayouts/slideLayout8.xml><?xml version="1.0" encoding="utf-8"?>
-<p:sldLayout xmlns:a="http://schemas.openxmlformats.org/drawingml/2006/main" xmlns:r="http://schemas.openxmlformats.org/officeDocument/2006/relationships" xmlns:p="http://schemas.openxmlformats.org/presentationml/2006/main" type="objTx" preserve="1">
+<p:sldLayout xmlns:a="http://schemas.openxmlformats.org/drawingml/2006/main" xmlns:r="http://schemas.openxmlformats.org/officeDocument/2006/relationships" xmlns:p="http://schemas.openxmlformats.org/presentationml/2006/main" showMasterSp="0" type="objTx" preserve="1">
   <p:cSld name="Content with Caption">
     <p:spTree>
       <p:nvGrpSpPr>
@@ -1901,25 +2351,107 @@
       </p:grpSpPr>
       <p:sp>
         <p:nvSpPr>
-          <p:cNvPr id="2" name="Title 1"/>
-          <p:cNvSpPr>
-            <a:spLocks noGrp="1"/>
-          </p:cNvSpPr>
-          <p:nvPr>
-            <p:ph type="title"/>
-          </p:nvPr>
+          <p:cNvPr id="8" name="Rectangle 7"/>
+          <p:cNvSpPr/>
+          <p:nvPr/>
         </p:nvSpPr>
         <p:spPr>
           <a:xfrm>
-            <a:off x="839788" y="457200"/>
-            <a:ext cx="3932237" cy="1600200"/>
+            <a:off x="16" y="0"/>
+            <a:ext cx="4050791" cy="6858000"/>
+          </a:xfrm>
+          <a:prstGeom prst="rect">
+            <a:avLst/>
+          </a:prstGeom>
+          <a:solidFill>
+            <a:schemeClr val="accent2"/>
+          </a:solidFill>
+          <a:ln>
+            <a:noFill/>
+          </a:ln>
+        </p:spPr>
+        <p:style>
+          <a:lnRef idx="2">
+            <a:schemeClr val="accent1">
+              <a:shade val="50000"/>
+            </a:schemeClr>
+          </a:lnRef>
+          <a:fillRef idx="1">
+            <a:schemeClr val="accent1"/>
+          </a:fillRef>
+          <a:effectRef idx="0">
+            <a:schemeClr val="accent1"/>
+          </a:effectRef>
+          <a:fontRef idx="minor">
+            <a:schemeClr val="lt1"/>
+          </a:fontRef>
+        </p:style>
+      </p:sp>
+      <p:sp>
+        <p:nvSpPr>
+          <p:cNvPr id="9" name="Rectangle 8"/>
+          <p:cNvSpPr/>
+          <p:nvPr/>
+        </p:nvSpPr>
+        <p:spPr>
+          <a:xfrm>
+            <a:off x="4040071" y="0"/>
+            <a:ext cx="64008" cy="6858000"/>
+          </a:xfrm>
+          <a:prstGeom prst="rect">
+            <a:avLst/>
+          </a:prstGeom>
+          <a:solidFill>
+            <a:schemeClr val="accent1"/>
+          </a:solidFill>
+          <a:ln>
+            <a:noFill/>
+          </a:ln>
+        </p:spPr>
+        <p:style>
+          <a:lnRef idx="2">
+            <a:schemeClr val="accent1">
+              <a:shade val="50000"/>
+            </a:schemeClr>
+          </a:lnRef>
+          <a:fillRef idx="1">
+            <a:schemeClr val="accent1"/>
+          </a:fillRef>
+          <a:effectRef idx="0">
+            <a:schemeClr val="accent1"/>
+          </a:effectRef>
+          <a:fontRef idx="minor">
+            <a:schemeClr val="lt1"/>
+          </a:fontRef>
+        </p:style>
+      </p:sp>
+      <p:sp>
+        <p:nvSpPr>
+          <p:cNvPr id="2" name="Title 1"/>
+          <p:cNvSpPr>
+            <a:spLocks noGrp="1"/>
+          </p:cNvSpPr>
+          <p:nvPr>
+            <p:ph type="title"/>
+          </p:nvPr>
+        </p:nvSpPr>
+        <p:spPr>
+          <a:xfrm>
+            <a:off x="457200" y="594359"/>
+            <a:ext cx="3200400" cy="2286000"/>
           </a:xfrm>
         </p:spPr>
         <p:txBody>
-          <a:bodyPr anchor="b"/>
+          <a:bodyPr anchor="b">
+            <a:normAutofit/>
+          </a:bodyPr>
           <a:lstStyle>
             <a:lvl1pPr>
-              <a:defRPr sz="3200"/>
+              <a:defRPr sz="3600" b="0">
+                <a:solidFill>
+                  <a:srgbClr val="FFFFFF"/>
+                </a:solidFill>
+              </a:defRPr>
             </a:lvl1pPr>
           </a:lstStyle>
           <a:p>
@@ -1927,7 +2459,7 @@
               <a:rPr lang="en-US" smtClean="0"/>
               <a:t>Click to edit Master title style</a:t>
             </a:r>
-            <a:endParaRPr lang="en-US"/>
+            <a:endParaRPr lang="en-US" dirty="0"/>
           </a:p>
         </p:txBody>
       </p:sp>
@@ -1943,200 +2475,208 @@
         </p:nvSpPr>
         <p:spPr>
           <a:xfrm>
-            <a:off x="5183188" y="987425"/>
-            <a:ext cx="6172200" cy="4873625"/>
+            <a:off x="4800600" y="731520"/>
+            <a:ext cx="6492240" cy="5257800"/>
           </a:xfrm>
         </p:spPr>
+        <p:txBody>
+          <a:bodyPr/>
+          <a:lstStyle/>
+          <a:p>
+            <a:pPr lvl="0"/>
+            <a:r>
+              <a:rPr lang="en-US" smtClean="0"/>
+              <a:t>Edit Master text styles</a:t>
+            </a:r>
+          </a:p>
+          <a:p>
+            <a:pPr lvl="1"/>
+            <a:r>
+              <a:rPr lang="en-US" smtClean="0"/>
+              <a:t>Second level</a:t>
+            </a:r>
+          </a:p>
+          <a:p>
+            <a:pPr lvl="2"/>
+            <a:r>
+              <a:rPr lang="en-US" smtClean="0"/>
+              <a:t>Third level</a:t>
+            </a:r>
+          </a:p>
+          <a:p>
+            <a:pPr lvl="3"/>
+            <a:r>
+              <a:rPr lang="en-US" smtClean="0"/>
+              <a:t>Fourth level</a:t>
+            </a:r>
+          </a:p>
+          <a:p>
+            <a:pPr lvl="4"/>
+            <a:r>
+              <a:rPr lang="en-US" smtClean="0"/>
+              <a:t>Fifth level</a:t>
+            </a:r>
+            <a:endParaRPr lang="en-US" dirty="0"/>
+          </a:p>
+        </p:txBody>
+      </p:sp>
+      <p:sp>
+        <p:nvSpPr>
+          <p:cNvPr id="4" name="Text Placeholder 3"/>
+          <p:cNvSpPr>
+            <a:spLocks noGrp="1"/>
+          </p:cNvSpPr>
+          <p:nvPr>
+            <p:ph type="body" sz="half" idx="2"/>
+          </p:nvPr>
+        </p:nvSpPr>
+        <p:spPr>
+          <a:xfrm>
+            <a:off x="457200" y="2926080"/>
+            <a:ext cx="3200400" cy="3379124"/>
+          </a:xfrm>
+        </p:spPr>
+        <p:txBody>
+          <a:bodyPr lIns="91440" rIns="91440">
+            <a:normAutofit/>
+          </a:bodyPr>
+          <a:lstStyle>
+            <a:lvl1pPr marL="0" indent="0">
+              <a:buNone/>
+              <a:defRPr sz="1500">
+                <a:solidFill>
+                  <a:srgbClr val="FFFFFF"/>
+                </a:solidFill>
+              </a:defRPr>
+            </a:lvl1pPr>
+            <a:lvl2pPr marL="457200" indent="0">
+              <a:buNone/>
+              <a:defRPr sz="1200"/>
+            </a:lvl2pPr>
+            <a:lvl3pPr marL="914400" indent="0">
+              <a:buNone/>
+              <a:defRPr sz="1000"/>
+            </a:lvl3pPr>
+            <a:lvl4pPr marL="1371600" indent="0">
+              <a:buNone/>
+              <a:defRPr sz="900"/>
+            </a:lvl4pPr>
+            <a:lvl5pPr marL="1828800" indent="0">
+              <a:buNone/>
+              <a:defRPr sz="900"/>
+            </a:lvl5pPr>
+            <a:lvl6pPr marL="2286000" indent="0">
+              <a:buNone/>
+              <a:defRPr sz="900"/>
+            </a:lvl6pPr>
+            <a:lvl7pPr marL="2743200" indent="0">
+              <a:buNone/>
+              <a:defRPr sz="900"/>
+            </a:lvl7pPr>
+            <a:lvl8pPr marL="3200400" indent="0">
+              <a:buNone/>
+              <a:defRPr sz="900"/>
+            </a:lvl8pPr>
+            <a:lvl9pPr marL="3657600" indent="0">
+              <a:buNone/>
+              <a:defRPr sz="900"/>
+            </a:lvl9pPr>
+          </a:lstStyle>
+          <a:p>
+            <a:pPr lvl="0"/>
+            <a:r>
+              <a:rPr lang="en-US" smtClean="0"/>
+              <a:t>Edit Master text styles</a:t>
+            </a:r>
+          </a:p>
+        </p:txBody>
+      </p:sp>
+      <p:sp>
+        <p:nvSpPr>
+          <p:cNvPr id="5" name="Date Placeholder 4"/>
+          <p:cNvSpPr>
+            <a:spLocks noGrp="1"/>
+          </p:cNvSpPr>
+          <p:nvPr>
+            <p:ph type="dt" sz="half" idx="10"/>
+          </p:nvPr>
+        </p:nvSpPr>
+        <p:spPr>
+          <a:xfrm>
+            <a:off x="465512" y="6459785"/>
+            <a:ext cx="2618510" cy="365125"/>
+          </a:xfrm>
+        </p:spPr>
+        <p:txBody>
+          <a:bodyPr/>
+          <a:lstStyle>
+            <a:lvl1pPr algn="l">
+              <a:defRPr/>
+            </a:lvl1pPr>
+          </a:lstStyle>
+          <a:p>
+            <a:fld id="{C4D78F53-A023-4DBB-876D-99733EBAC764}" type="datetimeFigureOut">
+              <a:rPr lang="en-US" smtClean="0"/>
+              <a:t>11/19/2019</a:t>
+            </a:fld>
+            <a:endParaRPr lang="en-US"/>
+          </a:p>
+        </p:txBody>
+      </p:sp>
+      <p:sp>
+        <p:nvSpPr>
+          <p:cNvPr id="6" name="Footer Placeholder 5"/>
+          <p:cNvSpPr>
+            <a:spLocks noGrp="1"/>
+          </p:cNvSpPr>
+          <p:nvPr>
+            <p:ph type="ftr" sz="quarter" idx="11"/>
+          </p:nvPr>
+        </p:nvSpPr>
+        <p:spPr>
+          <a:xfrm>
+            <a:off x="4800600" y="6459785"/>
+            <a:ext cx="4648200" cy="365125"/>
+          </a:xfrm>
+        </p:spPr>
+        <p:txBody>
+          <a:bodyPr/>
+          <a:lstStyle>
+            <a:lvl1pPr algn="l">
+              <a:defRPr>
+                <a:solidFill>
+                  <a:schemeClr val="tx2"/>
+                </a:solidFill>
+              </a:defRPr>
+            </a:lvl1pPr>
+          </a:lstStyle>
+          <a:p>
+            <a:endParaRPr lang="en-US"/>
+          </a:p>
+        </p:txBody>
+      </p:sp>
+      <p:sp>
+        <p:nvSpPr>
+          <p:cNvPr id="7" name="Slide Number Placeholder 6"/>
+          <p:cNvSpPr>
+            <a:spLocks noGrp="1"/>
+          </p:cNvSpPr>
+          <p:nvPr>
+            <p:ph type="sldNum" sz="quarter" idx="12"/>
+          </p:nvPr>
+        </p:nvSpPr>
+        <p:spPr/>
         <p:txBody>
           <a:bodyPr/>
           <a:lstStyle>
             <a:lvl1pPr>
-              <a:defRPr sz="3200"/>
+              <a:defRPr>
+                <a:solidFill>
+                  <a:schemeClr val="tx2"/>
+                </a:solidFill>
+              </a:defRPr>
             </a:lvl1pPr>
-            <a:lvl2pPr>
-              <a:defRPr sz="2800"/>
-            </a:lvl2pPr>
-            <a:lvl3pPr>
-              <a:defRPr sz="2400"/>
-            </a:lvl3pPr>
-            <a:lvl4pPr>
-              <a:defRPr sz="2000"/>
-            </a:lvl4pPr>
-            <a:lvl5pPr>
-              <a:defRPr sz="2000"/>
-            </a:lvl5pPr>
-            <a:lvl6pPr>
-              <a:defRPr sz="2000"/>
-            </a:lvl6pPr>
-            <a:lvl7pPr>
-              <a:defRPr sz="2000"/>
-            </a:lvl7pPr>
-            <a:lvl8pPr>
-              <a:defRPr sz="2000"/>
-            </a:lvl8pPr>
-            <a:lvl9pPr>
-              <a:defRPr sz="2000"/>
-            </a:lvl9pPr>
           </a:lstStyle>
-          <a:p>
-            <a:pPr lvl="0"/>
-            <a:r>
-              <a:rPr lang="en-US" smtClean="0"/>
-              <a:t>Edit Master text styles</a:t>
-            </a:r>
-          </a:p>
-          <a:p>
-            <a:pPr lvl="1"/>
-            <a:r>
-              <a:rPr lang="en-US" smtClean="0"/>
-              <a:t>Second level</a:t>
-            </a:r>
-          </a:p>
-          <a:p>
-            <a:pPr lvl="2"/>
-            <a:r>
-              <a:rPr lang="en-US" smtClean="0"/>
-              <a:t>Third level</a:t>
-            </a:r>
-          </a:p>
-          <a:p>
-            <a:pPr lvl="3"/>
-            <a:r>
-              <a:rPr lang="en-US" smtClean="0"/>
-              <a:t>Fourth level</a:t>
-            </a:r>
-          </a:p>
-          <a:p>
-            <a:pPr lvl="4"/>
-            <a:r>
-              <a:rPr lang="en-US" smtClean="0"/>
-              <a:t>Fifth level</a:t>
-            </a:r>
-            <a:endParaRPr lang="en-US"/>
-          </a:p>
-        </p:txBody>
-      </p:sp>
-      <p:sp>
-        <p:nvSpPr>
-          <p:cNvPr id="4" name="Text Placeholder 3"/>
-          <p:cNvSpPr>
-            <a:spLocks noGrp="1"/>
-          </p:cNvSpPr>
-          <p:nvPr>
-            <p:ph type="body" sz="half" idx="2"/>
-          </p:nvPr>
-        </p:nvSpPr>
-        <p:spPr>
-          <a:xfrm>
-            <a:off x="839788" y="2057400"/>
-            <a:ext cx="3932237" cy="3811588"/>
-          </a:xfrm>
-        </p:spPr>
-        <p:txBody>
-          <a:bodyPr/>
-          <a:lstStyle>
-            <a:lvl1pPr marL="0" indent="0">
-              <a:buNone/>
-              <a:defRPr sz="1600"/>
-            </a:lvl1pPr>
-            <a:lvl2pPr marL="457200" indent="0">
-              <a:buNone/>
-              <a:defRPr sz="1400"/>
-            </a:lvl2pPr>
-            <a:lvl3pPr marL="914400" indent="0">
-              <a:buNone/>
-              <a:defRPr sz="1200"/>
-            </a:lvl3pPr>
-            <a:lvl4pPr marL="1371600" indent="0">
-              <a:buNone/>
-              <a:defRPr sz="1000"/>
-            </a:lvl4pPr>
-            <a:lvl5pPr marL="1828800" indent="0">
-              <a:buNone/>
-              <a:defRPr sz="1000"/>
-            </a:lvl5pPr>
-            <a:lvl6pPr marL="2286000" indent="0">
-              <a:buNone/>
-              <a:defRPr sz="1000"/>
-            </a:lvl6pPr>
-            <a:lvl7pPr marL="2743200" indent="0">
-              <a:buNone/>
-              <a:defRPr sz="1000"/>
-            </a:lvl7pPr>
-            <a:lvl8pPr marL="3200400" indent="0">
-              <a:buNone/>
-              <a:defRPr sz="1000"/>
-            </a:lvl8pPr>
-            <a:lvl9pPr marL="3657600" indent="0">
-              <a:buNone/>
-              <a:defRPr sz="1000"/>
-            </a:lvl9pPr>
-          </a:lstStyle>
-          <a:p>
-            <a:pPr lvl="0"/>
-            <a:r>
-              <a:rPr lang="en-US" smtClean="0"/>
-              <a:t>Edit Master text styles</a:t>
-            </a:r>
-          </a:p>
-        </p:txBody>
-      </p:sp>
-      <p:sp>
-        <p:nvSpPr>
-          <p:cNvPr id="5" name="Date Placeholder 4"/>
-          <p:cNvSpPr>
-            <a:spLocks noGrp="1"/>
-          </p:cNvSpPr>
-          <p:nvPr>
-            <p:ph type="dt" sz="half" idx="10"/>
-          </p:nvPr>
-        </p:nvSpPr>
-        <p:spPr/>
-        <p:txBody>
-          <a:bodyPr/>
-          <a:lstStyle/>
-          <a:p>
-            <a:fld id="{C4D78F53-A023-4DBB-876D-99733EBAC764}" type="datetimeFigureOut">
-              <a:rPr lang="en-US" smtClean="0"/>
-              <a:t>11/18/2019</a:t>
-            </a:fld>
-            <a:endParaRPr lang="en-US"/>
-          </a:p>
-        </p:txBody>
-      </p:sp>
-      <p:sp>
-        <p:nvSpPr>
-          <p:cNvPr id="6" name="Footer Placeholder 5"/>
-          <p:cNvSpPr>
-            <a:spLocks noGrp="1"/>
-          </p:cNvSpPr>
-          <p:nvPr>
-            <p:ph type="ftr" sz="quarter" idx="11"/>
-          </p:nvPr>
-        </p:nvSpPr>
-        <p:spPr/>
-        <p:txBody>
-          <a:bodyPr/>
-          <a:lstStyle/>
-          <a:p>
-            <a:endParaRPr lang="en-US"/>
-          </a:p>
-        </p:txBody>
-      </p:sp>
-      <p:sp>
-        <p:nvSpPr>
-          <p:cNvPr id="7" name="Slide Number Placeholder 6"/>
-          <p:cNvSpPr>
-            <a:spLocks noGrp="1"/>
-          </p:cNvSpPr>
-          <p:nvPr>
-            <p:ph type="sldNum" sz="quarter" idx="12"/>
-          </p:nvPr>
-        </p:nvSpPr>
-        <p:spPr/>
-        <p:txBody>
-          <a:bodyPr/>
-          <a:lstStyle/>
           <a:p>
             <a:fld id="{7A3EEAF8-0307-45C1-AD27-1AEDD58C02F2}" type="slidenum">
               <a:rPr lang="en-US" smtClean="0"/>
@@ -2149,7 +2689,7 @@
     </p:spTree>
     <p:extLst>
       <p:ext uri="{BB962C8B-B14F-4D97-AF65-F5344CB8AC3E}">
-        <p14:creationId xmlns:p14="http://schemas.microsoft.com/office/powerpoint/2010/main" val="2954878849"/>
+        <p14:creationId xmlns:p14="http://schemas.microsoft.com/office/powerpoint/2010/main" val="2321191281"/>
       </p:ext>
     </p:extLst>
   </p:cSld>
@@ -2160,7 +2700,7 @@
 </file>
 
 <file path=ppt/slideLayouts/slideLayout9.xml><?xml version="1.0" encoding="utf-8"?>
-<p:sldLayout xmlns:a="http://schemas.openxmlformats.org/drawingml/2006/main" xmlns:r="http://schemas.openxmlformats.org/officeDocument/2006/relationships" xmlns:p="http://schemas.openxmlformats.org/presentationml/2006/main" type="picTx" preserve="1">
+<p:sldLayout xmlns:a="http://schemas.openxmlformats.org/drawingml/2006/main" xmlns:r="http://schemas.openxmlformats.org/officeDocument/2006/relationships" xmlns:p="http://schemas.openxmlformats.org/presentationml/2006/main" showMasterSp="0" type="picTx" preserve="1">
   <p:cSld name="Picture with Caption">
     <p:spTree>
       <p:nvGrpSpPr>
@@ -2178,25 +2718,107 @@
       </p:grpSpPr>
       <p:sp>
         <p:nvSpPr>
-          <p:cNvPr id="2" name="Title 1"/>
-          <p:cNvSpPr>
-            <a:spLocks noGrp="1"/>
-          </p:cNvSpPr>
-          <p:nvPr>
-            <p:ph type="title"/>
-          </p:nvPr>
+          <p:cNvPr id="8" name="Rectangle 7"/>
+          <p:cNvSpPr/>
+          <p:nvPr/>
         </p:nvSpPr>
         <p:spPr>
           <a:xfrm>
-            <a:off x="839788" y="457200"/>
-            <a:ext cx="3932237" cy="1600200"/>
+            <a:off x="0" y="4953000"/>
+            <a:ext cx="12188825" cy="1905000"/>
+          </a:xfrm>
+          <a:prstGeom prst="rect">
+            <a:avLst/>
+          </a:prstGeom>
+          <a:solidFill>
+            <a:schemeClr val="accent2"/>
+          </a:solidFill>
+          <a:ln>
+            <a:noFill/>
+          </a:ln>
+        </p:spPr>
+        <p:style>
+          <a:lnRef idx="2">
+            <a:schemeClr val="accent1">
+              <a:shade val="50000"/>
+            </a:schemeClr>
+          </a:lnRef>
+          <a:fillRef idx="1">
+            <a:schemeClr val="accent1"/>
+          </a:fillRef>
+          <a:effectRef idx="0">
+            <a:schemeClr val="accent1"/>
+          </a:effectRef>
+          <a:fontRef idx="minor">
+            <a:schemeClr val="lt1"/>
+          </a:fontRef>
+        </p:style>
+      </p:sp>
+      <p:sp>
+        <p:nvSpPr>
+          <p:cNvPr id="9" name="Rectangle 8"/>
+          <p:cNvSpPr/>
+          <p:nvPr/>
+        </p:nvSpPr>
+        <p:spPr>
+          <a:xfrm>
+            <a:off x="15" y="4915076"/>
+            <a:ext cx="12188825" cy="64008"/>
+          </a:xfrm>
+          <a:prstGeom prst="rect">
+            <a:avLst/>
+          </a:prstGeom>
+          <a:solidFill>
+            <a:schemeClr val="accent1"/>
+          </a:solidFill>
+          <a:ln>
+            <a:noFill/>
+          </a:ln>
+        </p:spPr>
+        <p:style>
+          <a:lnRef idx="2">
+            <a:schemeClr val="accent1">
+              <a:shade val="50000"/>
+            </a:schemeClr>
+          </a:lnRef>
+          <a:fillRef idx="1">
+            <a:schemeClr val="accent1"/>
+          </a:fillRef>
+          <a:effectRef idx="0">
+            <a:schemeClr val="accent1"/>
+          </a:effectRef>
+          <a:fontRef idx="minor">
+            <a:schemeClr val="lt1"/>
+          </a:fontRef>
+        </p:style>
+      </p:sp>
+      <p:sp>
+        <p:nvSpPr>
+          <p:cNvPr id="2" name="Title 1"/>
+          <p:cNvSpPr>
+            <a:spLocks noGrp="1"/>
+          </p:cNvSpPr>
+          <p:nvPr>
+            <p:ph type="title"/>
+          </p:nvPr>
+        </p:nvSpPr>
+        <p:spPr>
+          <a:xfrm>
+            <a:off x="1097280" y="5074920"/>
+            <a:ext cx="10113645" cy="822960"/>
           </a:xfrm>
         </p:spPr>
         <p:txBody>
-          <a:bodyPr anchor="b"/>
+          <a:bodyPr tIns="0" bIns="0" anchor="b">
+            <a:noAutofit/>
+          </a:bodyPr>
           <a:lstStyle>
             <a:lvl1pPr>
-              <a:defRPr sz="3200"/>
+              <a:defRPr sz="3600" b="0">
+                <a:solidFill>
+                  <a:srgbClr val="FFFFFF"/>
+                </a:solidFill>
+              </a:defRPr>
             </a:lvl1pPr>
           </a:lstStyle>
           <a:p>
@@ -2204,7 +2826,7 @@
               <a:rPr lang="en-US" smtClean="0"/>
               <a:t>Click to edit Master title style</a:t>
             </a:r>
-            <a:endParaRPr lang="en-US"/>
+            <a:endParaRPr lang="en-US" dirty="0"/>
           </a:p>
         </p:txBody>
       </p:sp>
@@ -2212,7 +2834,7 @@
         <p:nvSpPr>
           <p:cNvPr id="3" name="Picture Placeholder 2"/>
           <p:cNvSpPr>
-            <a:spLocks noGrp="1"/>
+            <a:spLocks noGrp="1" noChangeAspect="1"/>
           </p:cNvSpPr>
           <p:nvPr>
             <p:ph type="pic" idx="1"/>
@@ -2220,12 +2842,17 @@
         </p:nvSpPr>
         <p:spPr>
           <a:xfrm>
-            <a:off x="5183188" y="987425"/>
-            <a:ext cx="6172200" cy="4873625"/>
+            <a:off x="15" y="0"/>
+            <a:ext cx="12191985" cy="4915076"/>
           </a:xfrm>
+          <a:solidFill>
+            <a:schemeClr val="bg2">
+              <a:lumMod val="90000"/>
+            </a:schemeClr>
+          </a:solidFill>
         </p:spPr>
         <p:txBody>
-          <a:bodyPr/>
+          <a:bodyPr lIns="457200" tIns="457200" anchor="t"/>
           <a:lstStyle>
             <a:lvl1pPr marL="0" indent="0">
               <a:buNone/>
@@ -2265,7 +2892,11 @@
             </a:lvl9pPr>
           </a:lstStyle>
           <a:p>
-            <a:endParaRPr lang="en-US"/>
+            <a:r>
+              <a:rPr lang="en-US" smtClean="0"/>
+              <a:t>Click icon to add picture</a:t>
+            </a:r>
+            <a:endParaRPr lang="en-US" dirty="0"/>
           </a:p>
         </p:txBody>
       </p:sp>
@@ -2281,48 +2912,60 @@
         </p:nvSpPr>
         <p:spPr>
           <a:xfrm>
-            <a:off x="839788" y="2057400"/>
-            <a:ext cx="3932237" cy="3811588"/>
+            <a:off x="1097280" y="5907024"/>
+            <a:ext cx="10113264" cy="594360"/>
           </a:xfrm>
         </p:spPr>
         <p:txBody>
-          <a:bodyPr/>
+          <a:bodyPr lIns="91440" tIns="0" rIns="91440" bIns="0">
+            <a:normAutofit/>
+          </a:bodyPr>
           <a:lstStyle>
             <a:lvl1pPr marL="0" indent="0">
-              <a:buNone/>
-              <a:defRPr sz="1600"/>
+              <a:spcBef>
+                <a:spcPts val="0"/>
+              </a:spcBef>
+              <a:spcAft>
+                <a:spcPts val="600"/>
+              </a:spcAft>
+              <a:buNone/>
+              <a:defRPr sz="1500">
+                <a:solidFill>
+                  <a:srgbClr val="FFFFFF"/>
+                </a:solidFill>
+              </a:defRPr>
             </a:lvl1pPr>
             <a:lvl2pPr marL="457200" indent="0">
               <a:buNone/>
-              <a:defRPr sz="1400"/>
+              <a:defRPr sz="1200"/>
             </a:lvl2pPr>
             <a:lvl3pPr marL="914400" indent="0">
               <a:buNone/>
-              <a:defRPr sz="1200"/>
+              <a:defRPr sz="1000"/>
             </a:lvl3pPr>
             <a:lvl4pPr marL="1371600" indent="0">
               <a:buNone/>
-              <a:defRPr sz="1000"/>
+              <a:defRPr sz="900"/>
             </a:lvl4pPr>
             <a:lvl5pPr marL="1828800" indent="0">
               <a:buNone/>
-              <a:defRPr sz="1000"/>
+              <a:defRPr sz="900"/>
             </a:lvl5pPr>
             <a:lvl6pPr marL="2286000" indent="0">
               <a:buNone/>
-              <a:defRPr sz="1000"/>
+              <a:defRPr sz="900"/>
             </a:lvl6pPr>
             <a:lvl7pPr marL="2743200" indent="0">
               <a:buNone/>
-              <a:defRPr sz="1000"/>
+              <a:defRPr sz="900"/>
             </a:lvl7pPr>
             <a:lvl8pPr marL="3200400" indent="0">
               <a:buNone/>
-              <a:defRPr sz="1000"/>
+              <a:defRPr sz="900"/>
             </a:lvl8pPr>
             <a:lvl9pPr marL="3657600" indent="0">
               <a:buNone/>
-              <a:defRPr sz="1000"/>
+              <a:defRPr sz="900"/>
             </a:lvl9pPr>
           </a:lstStyle>
           <a:p>
@@ -2351,7 +2994,7 @@
           <a:p>
             <a:fld id="{C4D78F53-A023-4DBB-876D-99733EBAC764}" type="datetimeFigureOut">
               <a:rPr lang="en-US" smtClean="0"/>
-              <a:t>11/18/2019</a:t>
+              <a:t>11/19/2019</a:t>
             </a:fld>
             <a:endParaRPr lang="en-US"/>
           </a:p>
@@ -2402,7 +3045,7 @@
     </p:spTree>
     <p:extLst>
       <p:ext uri="{BB962C8B-B14F-4D97-AF65-F5344CB8AC3E}">
-        <p14:creationId xmlns:p14="http://schemas.microsoft.com/office/powerpoint/2010/main" val="4175221948"/>
+        <p14:creationId xmlns:p14="http://schemas.microsoft.com/office/powerpoint/2010/main" val="245027274"/>
       </p:ext>
     </p:extLst>
   </p:cSld>
@@ -2436,25 +3079,101 @@
       </p:grpSpPr>
       <p:sp>
         <p:nvSpPr>
-          <p:cNvPr id="2" name="Title Placeholder 1"/>
-          <p:cNvSpPr>
-            <a:spLocks noGrp="1"/>
-          </p:cNvSpPr>
-          <p:nvPr>
-            <p:ph type="title"/>
-          </p:nvPr>
+          <p:cNvPr id="7" name="Rectangle 6"/>
+          <p:cNvSpPr/>
+          <p:nvPr/>
         </p:nvSpPr>
         <p:spPr>
           <a:xfrm>
-            <a:off x="838200" y="365125"/>
-            <a:ext cx="10515600" cy="1325563"/>
+            <a:off x="3175" y="6400800"/>
+            <a:ext cx="12188825" cy="457200"/>
+          </a:xfrm>
+          <a:prstGeom prst="rect">
+            <a:avLst/>
+          </a:prstGeom>
+          <a:solidFill>
+            <a:schemeClr val="accent2"/>
+          </a:solidFill>
+          <a:ln>
+            <a:noFill/>
+          </a:ln>
+        </p:spPr>
+        <p:style>
+          <a:lnRef idx="2">
+            <a:schemeClr val="accent1">
+              <a:shade val="50000"/>
+            </a:schemeClr>
+          </a:lnRef>
+          <a:fillRef idx="1">
+            <a:schemeClr val="accent1"/>
+          </a:fillRef>
+          <a:effectRef idx="0">
+            <a:schemeClr val="accent1"/>
+          </a:effectRef>
+          <a:fontRef idx="minor">
+            <a:schemeClr val="lt1"/>
+          </a:fontRef>
+        </p:style>
+      </p:sp>
+      <p:sp>
+        <p:nvSpPr>
+          <p:cNvPr id="9" name="Rectangle 8"/>
+          <p:cNvSpPr/>
+          <p:nvPr/>
+        </p:nvSpPr>
+        <p:spPr>
+          <a:xfrm>
+            <a:off x="15" y="6334316"/>
+            <a:ext cx="12188825" cy="64008"/>
+          </a:xfrm>
+          <a:prstGeom prst="rect">
+            <a:avLst/>
+          </a:prstGeom>
+          <a:solidFill>
+            <a:schemeClr val="accent1"/>
+          </a:solidFill>
+          <a:ln>
+            <a:noFill/>
+          </a:ln>
+        </p:spPr>
+        <p:style>
+          <a:lnRef idx="2">
+            <a:schemeClr val="accent1">
+              <a:shade val="50000"/>
+            </a:schemeClr>
+          </a:lnRef>
+          <a:fillRef idx="1">
+            <a:schemeClr val="accent1"/>
+          </a:fillRef>
+          <a:effectRef idx="0">
+            <a:schemeClr val="accent1"/>
+          </a:effectRef>
+          <a:fontRef idx="minor">
+            <a:schemeClr val="lt1"/>
+          </a:fontRef>
+        </p:style>
+      </p:sp>
+      <p:sp>
+        <p:nvSpPr>
+          <p:cNvPr id="2" name="Title Placeholder 1"/>
+          <p:cNvSpPr>
+            <a:spLocks noGrp="1"/>
+          </p:cNvSpPr>
+          <p:nvPr>
+            <p:ph type="title"/>
+          </p:nvPr>
+        </p:nvSpPr>
+        <p:spPr>
+          <a:xfrm>
+            <a:off x="1097280" y="286603"/>
+            <a:ext cx="10058400" cy="1450757"/>
           </a:xfrm>
           <a:prstGeom prst="rect">
             <a:avLst/>
           </a:prstGeom>
         </p:spPr>
         <p:txBody>
-          <a:bodyPr vert="horz" lIns="91440" tIns="45720" rIns="91440" bIns="45720" rtlCol="0" anchor="ctr">
+          <a:bodyPr vert="horz" lIns="91440" tIns="45720" rIns="91440" bIns="45720" rtlCol="0" anchor="b">
             <a:normAutofit/>
           </a:bodyPr>
           <a:lstStyle/>
@@ -2463,7 +3182,7 @@
               <a:rPr lang="en-US" smtClean="0"/>
               <a:t>Click to edit Master title style</a:t>
             </a:r>
-            <a:endParaRPr lang="en-US"/>
+            <a:endParaRPr lang="en-US" dirty="0"/>
           </a:p>
         </p:txBody>
       </p:sp>
@@ -2479,15 +3198,15 @@
         </p:nvSpPr>
         <p:spPr>
           <a:xfrm>
-            <a:off x="838200" y="1825625"/>
-            <a:ext cx="10515600" cy="4351338"/>
+            <a:off x="1097280" y="1845734"/>
+            <a:ext cx="10058400" cy="4023360"/>
           </a:xfrm>
           <a:prstGeom prst="rect">
             <a:avLst/>
           </a:prstGeom>
         </p:spPr>
         <p:txBody>
-          <a:bodyPr vert="horz" lIns="91440" tIns="45720" rIns="91440" bIns="45720" rtlCol="0">
+          <a:bodyPr vert="horz" lIns="0" tIns="45720" rIns="0" bIns="45720" rtlCol="0">
             <a:normAutofit/>
           </a:bodyPr>
           <a:lstStyle/>
@@ -2525,7 +3244,7 @@
               <a:rPr lang="en-US" smtClean="0"/>
               <a:t>Fifth level</a:t>
             </a:r>
-            <a:endParaRPr lang="en-US"/>
+            <a:endParaRPr lang="en-US" dirty="0"/>
           </a:p>
         </p:txBody>
       </p:sp>
@@ -2541,8 +3260,8 @@
         </p:nvSpPr>
         <p:spPr>
           <a:xfrm>
-            <a:off x="838200" y="6356350"/>
-            <a:ext cx="2743200" cy="365125"/>
+            <a:off x="1097280" y="6459785"/>
+            <a:ext cx="2472271" cy="365125"/>
           </a:xfrm>
           <a:prstGeom prst="rect">
             <a:avLst/>
@@ -2552,11 +3271,9 @@
           <a:bodyPr vert="horz" lIns="91440" tIns="45720" rIns="91440" bIns="45720" rtlCol="0" anchor="ctr"/>
           <a:lstStyle>
             <a:lvl1pPr algn="l">
-              <a:defRPr sz="1200">
-                <a:solidFill>
-                  <a:schemeClr val="tx1">
-                    <a:tint val="75000"/>
-                  </a:schemeClr>
+              <a:defRPr sz="900">
+                <a:solidFill>
+                  <a:srgbClr val="FFFFFF"/>
                 </a:solidFill>
               </a:defRPr>
             </a:lvl1pPr>
@@ -2564,7 +3281,7 @@
           <a:p>
             <a:fld id="{C4D78F53-A023-4DBB-876D-99733EBAC764}" type="datetimeFigureOut">
               <a:rPr lang="en-US" smtClean="0"/>
-              <a:t>11/18/2019</a:t>
+              <a:t>11/19/2019</a:t>
             </a:fld>
             <a:endParaRPr lang="en-US"/>
           </a:p>
@@ -2582,8 +3299,8 @@
         </p:nvSpPr>
         <p:spPr>
           <a:xfrm>
-            <a:off x="4038600" y="6356350"/>
-            <a:ext cx="4114800" cy="365125"/>
+            <a:off x="3686185" y="6459785"/>
+            <a:ext cx="4822804" cy="365125"/>
           </a:xfrm>
           <a:prstGeom prst="rect">
             <a:avLst/>
@@ -2593,11 +3310,9 @@
           <a:bodyPr vert="horz" lIns="91440" tIns="45720" rIns="91440" bIns="45720" rtlCol="0" anchor="ctr"/>
           <a:lstStyle>
             <a:lvl1pPr algn="ctr">
-              <a:defRPr sz="1200">
-                <a:solidFill>
-                  <a:schemeClr val="tx1">
-                    <a:tint val="75000"/>
-                  </a:schemeClr>
+              <a:defRPr sz="900" cap="all" baseline="0">
+                <a:solidFill>
+                  <a:srgbClr val="FFFFFF"/>
                 </a:solidFill>
               </a:defRPr>
             </a:lvl1pPr>
@@ -2619,8 +3334,8 @@
         </p:nvSpPr>
         <p:spPr>
           <a:xfrm>
-            <a:off x="8610600" y="6356350"/>
-            <a:ext cx="2743200" cy="365125"/>
+            <a:off x="9900458" y="6459785"/>
+            <a:ext cx="1312025" cy="365125"/>
           </a:xfrm>
           <a:prstGeom prst="rect">
             <a:avLst/>
@@ -2630,11 +3345,9 @@
           <a:bodyPr vert="horz" lIns="91440" tIns="45720" rIns="91440" bIns="45720" rtlCol="0" anchor="ctr"/>
           <a:lstStyle>
             <a:lvl1pPr algn="r">
-              <a:defRPr sz="1200">
-                <a:solidFill>
-                  <a:schemeClr val="tx1">
-                    <a:tint val="75000"/>
-                  </a:schemeClr>
+              <a:defRPr sz="1050">
+                <a:solidFill>
+                  <a:srgbClr val="FFFFFF"/>
                 </a:solidFill>
               </a:defRPr>
             </a:lvl1pPr>
@@ -2648,40 +3361,81 @@
           </a:p>
         </p:txBody>
       </p:sp>
+      <p:cxnSp>
+        <p:nvCxnSpPr>
+          <p:cNvPr id="10" name="Straight Connector 9"/>
+          <p:cNvCxnSpPr/>
+          <p:nvPr/>
+        </p:nvCxnSpPr>
+        <p:spPr>
+          <a:xfrm>
+            <a:off x="1193532" y="1737845"/>
+            <a:ext cx="9966960" cy="0"/>
+          </a:xfrm>
+          <a:prstGeom prst="line">
+            <a:avLst/>
+          </a:prstGeom>
+          <a:ln w="6350">
+            <a:solidFill>
+              <a:schemeClr val="tx1">
+                <a:lumMod val="50000"/>
+                <a:lumOff val="50000"/>
+              </a:schemeClr>
+            </a:solidFill>
+          </a:ln>
+        </p:spPr>
+        <p:style>
+          <a:lnRef idx="1">
+            <a:schemeClr val="accent1"/>
+          </a:lnRef>
+          <a:fillRef idx="0">
+            <a:schemeClr val="accent1"/>
+          </a:fillRef>
+          <a:effectRef idx="0">
+            <a:schemeClr val="accent1"/>
+          </a:effectRef>
+          <a:fontRef idx="minor">
+            <a:schemeClr val="tx1"/>
+          </a:fontRef>
+        </p:style>
+      </p:cxnSp>
     </p:spTree>
     <p:extLst>
       <p:ext uri="{BB962C8B-B14F-4D97-AF65-F5344CB8AC3E}">
-        <p14:creationId xmlns:p14="http://schemas.microsoft.com/office/powerpoint/2010/main" val="568851611"/>
+        <p14:creationId xmlns:p14="http://schemas.microsoft.com/office/powerpoint/2010/main" val="2181513749"/>
       </p:ext>
     </p:extLst>
   </p:cSld>
   <p:clrMap bg1="lt1" tx1="dk1" bg2="lt2" tx2="dk2" accent1="accent1" accent2="accent2" accent3="accent3" accent4="accent4" accent5="accent5" accent6="accent6" hlink="hlink" folHlink="folHlink"/>
   <p:sldLayoutIdLst>
-    <p:sldLayoutId id="2147483649" r:id="rId1"/>
-    <p:sldLayoutId id="2147483650" r:id="rId2"/>
-    <p:sldLayoutId id="2147483651" r:id="rId3"/>
-    <p:sldLayoutId id="2147483652" r:id="rId4"/>
-    <p:sldLayoutId id="2147483653" r:id="rId5"/>
-    <p:sldLayoutId id="2147483654" r:id="rId6"/>
-    <p:sldLayoutId id="2147483655" r:id="rId7"/>
-    <p:sldLayoutId id="2147483656" r:id="rId8"/>
-    <p:sldLayoutId id="2147483657" r:id="rId9"/>
-    <p:sldLayoutId id="2147483658" r:id="rId10"/>
-    <p:sldLayoutId id="2147483659" r:id="rId11"/>
+    <p:sldLayoutId id="2147483673" r:id="rId1"/>
+    <p:sldLayoutId id="2147483674" r:id="rId2"/>
+    <p:sldLayoutId id="2147483675" r:id="rId3"/>
+    <p:sldLayoutId id="2147483676" r:id="rId4"/>
+    <p:sldLayoutId id="2147483677" r:id="rId5"/>
+    <p:sldLayoutId id="2147483678" r:id="rId6"/>
+    <p:sldLayoutId id="2147483679" r:id="rId7"/>
+    <p:sldLayoutId id="2147483680" r:id="rId8"/>
+    <p:sldLayoutId id="2147483681" r:id="rId9"/>
+    <p:sldLayoutId id="2147483682" r:id="rId10"/>
+    <p:sldLayoutId id="2147483683" r:id="rId11"/>
   </p:sldLayoutIdLst>
   <p:txStyles>
     <p:titleStyle>
       <a:lvl1pPr algn="l" defTabSz="914400" rtl="0" eaLnBrk="1" latinLnBrk="0" hangingPunct="1">
         <a:lnSpc>
-          <a:spcPct val="90000"/>
+          <a:spcPct val="85000"/>
         </a:lnSpc>
         <a:spcBef>
           <a:spcPct val="0"/>
         </a:spcBef>
         <a:buNone/>
-        <a:defRPr sz="4400" kern="1200">
+        <a:defRPr sz="4800" kern="1200" spc="-50" baseline="0">
           <a:solidFill>
-            <a:schemeClr val="tx1"/>
+            <a:schemeClr val="tx1">
+              <a:lumMod val="75000"/>
+              <a:lumOff val="25000"/>
+            </a:schemeClr>
           </a:solidFill>
           <a:latin typeface="+mj-lt"/>
           <a:ea typeface="+mj-ea"/>
@@ -2690,162 +3444,244 @@
       </a:lvl1pPr>
     </p:titleStyle>
     <p:bodyStyle>
-      <a:lvl1pPr marL="228600" indent="-228600" algn="l" defTabSz="914400" rtl="0" eaLnBrk="1" latinLnBrk="0" hangingPunct="1">
+      <a:lvl1pPr marL="91440" indent="-91440" algn="l" defTabSz="914400" rtl="0" eaLnBrk="1" latinLnBrk="0" hangingPunct="1">
         <a:lnSpc>
           <a:spcPct val="90000"/>
         </a:lnSpc>
         <a:spcBef>
-          <a:spcPts val="1000"/>
+          <a:spcPts val="1200"/>
         </a:spcBef>
-        <a:buFont typeface="Arial" panose="020B0604020202020204" pitchFamily="34" charset="0"/>
-        <a:buChar char="•"/>
-        <a:defRPr sz="2800" kern="1200">
+        <a:spcAft>
+          <a:spcPts val="200"/>
+        </a:spcAft>
+        <a:buClr>
+          <a:schemeClr val="accent1"/>
+        </a:buClr>
+        <a:buSzPct val="100000"/>
+        <a:buFont typeface="Calibri" panose="020F0502020204030204" pitchFamily="34" charset="0"/>
+        <a:buChar char=" "/>
+        <a:defRPr sz="2000" kern="1200">
           <a:solidFill>
-            <a:schemeClr val="tx1"/>
+            <a:schemeClr val="tx1">
+              <a:lumMod val="75000"/>
+              <a:lumOff val="25000"/>
+            </a:schemeClr>
           </a:solidFill>
           <a:latin typeface="+mn-lt"/>
           <a:ea typeface="+mn-ea"/>
           <a:cs typeface="+mn-cs"/>
         </a:defRPr>
       </a:lvl1pPr>
-      <a:lvl2pPr marL="685800" indent="-228600" algn="l" defTabSz="914400" rtl="0" eaLnBrk="1" latinLnBrk="0" hangingPunct="1">
+      <a:lvl2pPr marL="384048" indent="-182880" algn="l" defTabSz="914400" rtl="0" eaLnBrk="1" latinLnBrk="0" hangingPunct="1">
         <a:lnSpc>
           <a:spcPct val="90000"/>
         </a:lnSpc>
         <a:spcBef>
-          <a:spcPts val="500"/>
+          <a:spcPts val="200"/>
         </a:spcBef>
-        <a:buFont typeface="Arial" panose="020B0604020202020204" pitchFamily="34" charset="0"/>
-        <a:buChar char="•"/>
-        <a:defRPr sz="2400" kern="1200">
+        <a:spcAft>
+          <a:spcPts val="400"/>
+        </a:spcAft>
+        <a:buClr>
+          <a:schemeClr val="accent1"/>
+        </a:buClr>
+        <a:buFont typeface="Calibri" pitchFamily="34" charset="0"/>
+        <a:buChar char="◦"/>
+        <a:defRPr sz="1800" kern="1200">
           <a:solidFill>
-            <a:schemeClr val="tx1"/>
+            <a:schemeClr val="tx1">
+              <a:lumMod val="75000"/>
+              <a:lumOff val="25000"/>
+            </a:schemeClr>
           </a:solidFill>
           <a:latin typeface="+mn-lt"/>
           <a:ea typeface="+mn-ea"/>
           <a:cs typeface="+mn-cs"/>
         </a:defRPr>
       </a:lvl2pPr>
-      <a:lvl3pPr marL="1143000" indent="-228600" algn="l" defTabSz="914400" rtl="0" eaLnBrk="1" latinLnBrk="0" hangingPunct="1">
+      <a:lvl3pPr marL="566928" indent="-182880" algn="l" defTabSz="914400" rtl="0" eaLnBrk="1" latinLnBrk="0" hangingPunct="1">
         <a:lnSpc>
           <a:spcPct val="90000"/>
         </a:lnSpc>
         <a:spcBef>
-          <a:spcPts val="500"/>
+          <a:spcPts val="200"/>
         </a:spcBef>
-        <a:buFont typeface="Arial" panose="020B0604020202020204" pitchFamily="34" charset="0"/>
-        <a:buChar char="•"/>
-        <a:defRPr sz="2000" kern="1200">
+        <a:spcAft>
+          <a:spcPts val="400"/>
+        </a:spcAft>
+        <a:buClr>
+          <a:schemeClr val="accent1"/>
+        </a:buClr>
+        <a:buFont typeface="Calibri" pitchFamily="34" charset="0"/>
+        <a:buChar char="◦"/>
+        <a:defRPr sz="1400" kern="1200">
           <a:solidFill>
-            <a:schemeClr val="tx1"/>
+            <a:schemeClr val="tx1">
+              <a:lumMod val="75000"/>
+              <a:lumOff val="25000"/>
+            </a:schemeClr>
           </a:solidFill>
           <a:latin typeface="+mn-lt"/>
           <a:ea typeface="+mn-ea"/>
           <a:cs typeface="+mn-cs"/>
         </a:defRPr>
       </a:lvl3pPr>
-      <a:lvl4pPr marL="1600200" indent="-228600" algn="l" defTabSz="914400" rtl="0" eaLnBrk="1" latinLnBrk="0" hangingPunct="1">
+      <a:lvl4pPr marL="749808" indent="-182880" algn="l" defTabSz="914400" rtl="0" eaLnBrk="1" latinLnBrk="0" hangingPunct="1">
         <a:lnSpc>
           <a:spcPct val="90000"/>
         </a:lnSpc>
         <a:spcBef>
-          <a:spcPts val="500"/>
+          <a:spcPts val="200"/>
         </a:spcBef>
-        <a:buFont typeface="Arial" panose="020B0604020202020204" pitchFamily="34" charset="0"/>
-        <a:buChar char="•"/>
-        <a:defRPr sz="1800" kern="1200">
+        <a:spcAft>
+          <a:spcPts val="400"/>
+        </a:spcAft>
+        <a:buClr>
+          <a:schemeClr val="accent1"/>
+        </a:buClr>
+        <a:buFont typeface="Calibri" pitchFamily="34" charset="0"/>
+        <a:buChar char="◦"/>
+        <a:defRPr sz="1400" kern="1200">
           <a:solidFill>
-            <a:schemeClr val="tx1"/>
+            <a:schemeClr val="tx1">
+              <a:lumMod val="75000"/>
+              <a:lumOff val="25000"/>
+            </a:schemeClr>
           </a:solidFill>
           <a:latin typeface="+mn-lt"/>
           <a:ea typeface="+mn-ea"/>
           <a:cs typeface="+mn-cs"/>
         </a:defRPr>
       </a:lvl4pPr>
-      <a:lvl5pPr marL="2057400" indent="-228600" algn="l" defTabSz="914400" rtl="0" eaLnBrk="1" latinLnBrk="0" hangingPunct="1">
+      <a:lvl5pPr marL="932688" indent="-182880" algn="l" defTabSz="914400" rtl="0" eaLnBrk="1" latinLnBrk="0" hangingPunct="1">
         <a:lnSpc>
           <a:spcPct val="90000"/>
         </a:lnSpc>
         <a:spcBef>
-          <a:spcPts val="500"/>
+          <a:spcPts val="200"/>
         </a:spcBef>
-        <a:buFont typeface="Arial" panose="020B0604020202020204" pitchFamily="34" charset="0"/>
-        <a:buChar char="•"/>
-        <a:defRPr sz="1800" kern="1200">
+        <a:spcAft>
+          <a:spcPts val="400"/>
+        </a:spcAft>
+        <a:buClr>
+          <a:schemeClr val="accent1"/>
+        </a:buClr>
+        <a:buFont typeface="Calibri" pitchFamily="34" charset="0"/>
+        <a:buChar char="◦"/>
+        <a:defRPr sz="1400" kern="1200">
           <a:solidFill>
-            <a:schemeClr val="tx1"/>
+            <a:schemeClr val="tx1">
+              <a:lumMod val="75000"/>
+              <a:lumOff val="25000"/>
+            </a:schemeClr>
           </a:solidFill>
           <a:latin typeface="+mn-lt"/>
           <a:ea typeface="+mn-ea"/>
           <a:cs typeface="+mn-cs"/>
         </a:defRPr>
       </a:lvl5pPr>
-      <a:lvl6pPr marL="2514600" indent="-228600" algn="l" defTabSz="914400" rtl="0" eaLnBrk="1" latinLnBrk="0" hangingPunct="1">
+      <a:lvl6pPr marL="1100000" indent="-228600" algn="l" defTabSz="914400" rtl="0" eaLnBrk="1" latinLnBrk="0" hangingPunct="1">
         <a:lnSpc>
           <a:spcPct val="90000"/>
         </a:lnSpc>
         <a:spcBef>
-          <a:spcPts val="500"/>
+          <a:spcPts val="200"/>
         </a:spcBef>
-        <a:buFont typeface="Arial" panose="020B0604020202020204" pitchFamily="34" charset="0"/>
-        <a:buChar char="•"/>
-        <a:defRPr sz="1800" kern="1200">
+        <a:spcAft>
+          <a:spcPts val="400"/>
+        </a:spcAft>
+        <a:buClr>
+          <a:schemeClr val="accent1"/>
+        </a:buClr>
+        <a:buFont typeface="Calibri" pitchFamily="34" charset="0"/>
+        <a:buChar char="◦"/>
+        <a:defRPr sz="1400" kern="1200">
           <a:solidFill>
-            <a:schemeClr val="tx1"/>
+            <a:schemeClr val="tx1">
+              <a:lumMod val="75000"/>
+              <a:lumOff val="25000"/>
+            </a:schemeClr>
           </a:solidFill>
           <a:latin typeface="+mn-lt"/>
           <a:ea typeface="+mn-ea"/>
           <a:cs typeface="+mn-cs"/>
         </a:defRPr>
       </a:lvl6pPr>
-      <a:lvl7pPr marL="2971800" indent="-228600" algn="l" defTabSz="914400" rtl="0" eaLnBrk="1" latinLnBrk="0" hangingPunct="1">
+      <a:lvl7pPr marL="1300000" indent="-228600" algn="l" defTabSz="914400" rtl="0" eaLnBrk="1" latinLnBrk="0" hangingPunct="1">
         <a:lnSpc>
           <a:spcPct val="90000"/>
         </a:lnSpc>
         <a:spcBef>
-          <a:spcPts val="500"/>
+          <a:spcPts val="200"/>
         </a:spcBef>
-        <a:buFont typeface="Arial" panose="020B0604020202020204" pitchFamily="34" charset="0"/>
-        <a:buChar char="•"/>
-        <a:defRPr sz="1800" kern="1200">
+        <a:spcAft>
+          <a:spcPts val="400"/>
+        </a:spcAft>
+        <a:buClr>
+          <a:schemeClr val="accent1"/>
+        </a:buClr>
+        <a:buFont typeface="Calibri" pitchFamily="34" charset="0"/>
+        <a:buChar char="◦"/>
+        <a:defRPr sz="1400" kern="1200">
           <a:solidFill>
-            <a:schemeClr val="tx1"/>
+            <a:schemeClr val="tx1">
+              <a:lumMod val="75000"/>
+              <a:lumOff val="25000"/>
+            </a:schemeClr>
           </a:solidFill>
           <a:latin typeface="+mn-lt"/>
           <a:ea typeface="+mn-ea"/>
           <a:cs typeface="+mn-cs"/>
         </a:defRPr>
       </a:lvl7pPr>
-      <a:lvl8pPr marL="3429000" indent="-228600" algn="l" defTabSz="914400" rtl="0" eaLnBrk="1" latinLnBrk="0" hangingPunct="1">
+      <a:lvl8pPr marL="1500000" indent="-228600" algn="l" defTabSz="914400" rtl="0" eaLnBrk="1" latinLnBrk="0" hangingPunct="1">
         <a:lnSpc>
           <a:spcPct val="90000"/>
         </a:lnSpc>
         <a:spcBef>
-          <a:spcPts val="500"/>
+          <a:spcPts val="200"/>
         </a:spcBef>
-        <a:buFont typeface="Arial" panose="020B0604020202020204" pitchFamily="34" charset="0"/>
-        <a:buChar char="•"/>
-        <a:defRPr sz="1800" kern="1200">
+        <a:spcAft>
+          <a:spcPts val="400"/>
+        </a:spcAft>
+        <a:buClr>
+          <a:schemeClr val="accent1"/>
+        </a:buClr>
+        <a:buFont typeface="Calibri" pitchFamily="34" charset="0"/>
+        <a:buChar char="◦"/>
+        <a:defRPr sz="1400" kern="1200">
           <a:solidFill>
-            <a:schemeClr val="tx1"/>
+            <a:schemeClr val="tx1">
+              <a:lumMod val="75000"/>
+              <a:lumOff val="25000"/>
+            </a:schemeClr>
           </a:solidFill>
           <a:latin typeface="+mn-lt"/>
           <a:ea typeface="+mn-ea"/>
           <a:cs typeface="+mn-cs"/>
         </a:defRPr>
       </a:lvl8pPr>
-      <a:lvl9pPr marL="3886200" indent="-228600" algn="l" defTabSz="914400" rtl="0" eaLnBrk="1" latinLnBrk="0" hangingPunct="1">
+      <a:lvl9pPr marL="1700000" indent="-228600" algn="l" defTabSz="914400" rtl="0" eaLnBrk="1" latinLnBrk="0" hangingPunct="1">
         <a:lnSpc>
           <a:spcPct val="90000"/>
         </a:lnSpc>
         <a:spcBef>
-          <a:spcPts val="500"/>
+          <a:spcPts val="200"/>
         </a:spcBef>
-        <a:buFont typeface="Arial" panose="020B0604020202020204" pitchFamily="34" charset="0"/>
-        <a:buChar char="•"/>
-        <a:defRPr sz="1800" kern="1200">
+        <a:spcAft>
+          <a:spcPts val="400"/>
+        </a:spcAft>
+        <a:buClr>
+          <a:schemeClr val="accent1"/>
+        </a:buClr>
+        <a:buFont typeface="Calibri" pitchFamily="34" charset="0"/>
+        <a:buChar char="◦"/>
+        <a:defRPr sz="1400" kern="1200">
           <a:solidFill>
-            <a:schemeClr val="tx1"/>
+            <a:schemeClr val="tx1">
+              <a:lumMod val="75000"/>
+              <a:lumOff val="25000"/>
+            </a:schemeClr>
           </a:solidFill>
           <a:latin typeface="+mn-lt"/>
           <a:ea typeface="+mn-ea"/>
@@ -2971,46 +3807,70 @@
       </p:grpSpPr>
       <p:sp>
         <p:nvSpPr>
-          <p:cNvPr id="2" name="Title 1"/>
-          <p:cNvSpPr>
-            <a:spLocks noGrp="1"/>
-          </p:cNvSpPr>
-          <p:nvPr>
-            <p:ph type="ctrTitle"/>
-          </p:nvPr>
-        </p:nvSpPr>
-        <p:spPr/>
+          <p:cNvPr id="3" name="Subtitle 2"/>
+          <p:cNvSpPr>
+            <a:spLocks noGrp="1"/>
+          </p:cNvSpPr>
+          <p:nvPr>
+            <p:ph type="subTitle" idx="1"/>
+          </p:nvPr>
+        </p:nvSpPr>
+        <p:spPr>
+          <a:xfrm>
+            <a:off x="2871536" y="2413962"/>
+            <a:ext cx="9144000" cy="1655762"/>
+          </a:xfrm>
+        </p:spPr>
         <p:txBody>
           <a:bodyPr/>
           <a:lstStyle/>
           <a:p>
             <a:r>
-              <a:rPr lang="en-US" dirty="0" smtClean="0"/>
-              <a:t>Microsoft</a:t>
-            </a:r>
-            <a:endParaRPr lang="en-US" dirty="0"/>
-          </a:p>
-        </p:txBody>
-      </p:sp>
-      <p:sp>
-        <p:nvSpPr>
-          <p:cNvPr id="3" name="Subtitle 2"/>
-          <p:cNvSpPr>
-            <a:spLocks noGrp="1"/>
-          </p:cNvSpPr>
-          <p:nvPr>
-            <p:ph type="subTitle" idx="1"/>
-          </p:nvPr>
-        </p:nvSpPr>
-        <p:spPr/>
-        <p:txBody>
-          <a:bodyPr/>
-          <a:lstStyle/>
-          <a:p>
-            <a:endParaRPr lang="en-US"/>
-          </a:p>
-        </p:txBody>
-      </p:sp>
+              <a:rPr lang="en-US" b="1" dirty="0" smtClean="0">
+                <a:solidFill>
+                  <a:schemeClr val="tx1">
+                    <a:lumMod val="50000"/>
+                    <a:lumOff val="50000"/>
+                  </a:schemeClr>
+                </a:solidFill>
+              </a:rPr>
+              <a:t>What it’s like working at</a:t>
+            </a:r>
+            <a:endParaRPr lang="en-US" b="1" dirty="0">
+              <a:solidFill>
+                <a:schemeClr val="tx1">
+                  <a:lumMod val="50000"/>
+                  <a:lumOff val="50000"/>
+                </a:schemeClr>
+              </a:solidFill>
+            </a:endParaRPr>
+          </a:p>
+        </p:txBody>
+      </p:sp>
+      <p:pic>
+        <p:nvPicPr>
+          <p:cNvPr id="7" name="Picture 6"/>
+          <p:cNvPicPr>
+            <a:picLocks noChangeAspect="1"/>
+          </p:cNvPicPr>
+          <p:nvPr/>
+        </p:nvPicPr>
+        <p:blipFill>
+          <a:blip r:embed="rId2"/>
+          <a:stretch>
+            <a:fillRect/>
+          </a:stretch>
+        </p:blipFill>
+        <p:spPr>
+          <a:xfrm>
+            <a:off x="1205449" y="2872875"/>
+            <a:ext cx="6444344" cy="1381880"/>
+          </a:xfrm>
+          <a:prstGeom prst="rect">
+            <a:avLst/>
+          </a:prstGeom>
+        </p:spPr>
+      </p:pic>
     </p:spTree>
     <p:extLst>
       <p:ext uri="{BB962C8B-B14F-4D97-AF65-F5344CB8AC3E}">
@@ -3021,6 +3881,13 @@
   <p:clrMapOvr>
     <a:masterClrMapping/>
   </p:clrMapOvr>
+  <p:timing>
+    <p:tnLst>
+      <p:par>
+        <p:cTn id="1" dur="indefinite" restart="never" nodeType="tmRoot"/>
+      </p:par>
+    </p:tnLst>
+  </p:timing>
 </p:sld>
 </file>
 
@@ -3057,10 +3924,24 @@
           <a:lstStyle/>
           <a:p>
             <a:r>
-              <a:rPr lang="en-US" dirty="0" smtClean="0"/>
+              <a:rPr lang="en-US" dirty="0" smtClean="0">
+                <a:solidFill>
+                  <a:schemeClr val="tx1">
+                    <a:lumMod val="50000"/>
+                    <a:lumOff val="50000"/>
+                  </a:schemeClr>
+                </a:solidFill>
+              </a:rPr>
               <a:t>Atmosphere</a:t>
             </a:r>
-            <a:endParaRPr lang="en-US" dirty="0"/>
+            <a:endParaRPr lang="en-US" dirty="0">
+              <a:solidFill>
+                <a:schemeClr val="tx1">
+                  <a:lumMod val="50000"/>
+                  <a:lumOff val="50000"/>
+                </a:schemeClr>
+              </a:solidFill>
+            </a:endParaRPr>
           </a:p>
         </p:txBody>
       </p:sp>
@@ -3076,13 +3957,211 @@
         </p:nvSpPr>
         <p:spPr/>
         <p:txBody>
-          <a:bodyPr/>
-          <a:lstStyle/>
-          <a:p>
-            <a:endParaRPr lang="en-US"/>
-          </a:p>
-        </p:txBody>
-      </p:sp>
+          <a:bodyPr>
+            <a:normAutofit lnSpcReduction="10000"/>
+          </a:bodyPr>
+          <a:lstStyle/>
+          <a:p>
+            <a:r>
+              <a:rPr lang="en-US" sz="2800" dirty="0" smtClean="0">
+                <a:solidFill>
+                  <a:schemeClr val="tx1">
+                    <a:lumMod val="50000"/>
+                    <a:lumOff val="50000"/>
+                  </a:schemeClr>
+                </a:solidFill>
+              </a:rPr>
+              <a:t>Good work/life balance; lots </a:t>
+            </a:r>
+            <a:r>
+              <a:rPr lang="en-US" sz="2800" dirty="0">
+                <a:solidFill>
+                  <a:schemeClr val="tx1">
+                    <a:lumMod val="50000"/>
+                    <a:lumOff val="50000"/>
+                  </a:schemeClr>
+                </a:solidFill>
+              </a:rPr>
+              <a:t>of </a:t>
+            </a:r>
+            <a:r>
+              <a:rPr lang="en-US" sz="2800" dirty="0" smtClean="0">
+                <a:solidFill>
+                  <a:schemeClr val="tx1">
+                    <a:lumMod val="50000"/>
+                    <a:lumOff val="50000"/>
+                  </a:schemeClr>
+                </a:solidFill>
+              </a:rPr>
+              <a:t>flexibility</a:t>
+            </a:r>
+          </a:p>
+          <a:p>
+            <a:r>
+              <a:rPr lang="en-US" sz="2800" dirty="0" smtClean="0">
+                <a:solidFill>
+                  <a:schemeClr val="tx1">
+                    <a:lumMod val="50000"/>
+                    <a:lumOff val="50000"/>
+                  </a:schemeClr>
+                </a:solidFill>
+              </a:rPr>
+              <a:t>Company/team events &amp; employee benefits</a:t>
+            </a:r>
+          </a:p>
+          <a:p>
+            <a:r>
+              <a:rPr lang="en-US" sz="2800" dirty="0" smtClean="0">
+                <a:solidFill>
+                  <a:schemeClr val="tx1">
+                    <a:lumMod val="50000"/>
+                    <a:lumOff val="50000"/>
+                  </a:schemeClr>
+                </a:solidFill>
+              </a:rPr>
+              <a:t>Can </a:t>
+            </a:r>
+            <a:r>
+              <a:rPr lang="en-US" sz="2800" dirty="0">
+                <a:solidFill>
+                  <a:schemeClr val="tx1">
+                    <a:lumMod val="50000"/>
+                    <a:lumOff val="50000"/>
+                  </a:schemeClr>
+                </a:solidFill>
+              </a:rPr>
+              <a:t>change </a:t>
+            </a:r>
+            <a:r>
+              <a:rPr lang="en-US" sz="2800" dirty="0" smtClean="0">
+                <a:solidFill>
+                  <a:schemeClr val="tx1">
+                    <a:lumMod val="50000"/>
+                    <a:lumOff val="50000"/>
+                  </a:schemeClr>
+                </a:solidFill>
+              </a:rPr>
+              <a:t>disciplines/teams fairly easily (sometimes too often)</a:t>
+            </a:r>
+          </a:p>
+          <a:p>
+            <a:r>
+              <a:rPr lang="en-US" sz="2800" dirty="0" smtClean="0">
+                <a:solidFill>
+                  <a:schemeClr val="tx1">
+                    <a:lumMod val="50000"/>
+                    <a:lumOff val="50000"/>
+                  </a:schemeClr>
+                </a:solidFill>
+              </a:rPr>
+              <a:t>Smart &amp; passionate coworkers</a:t>
+            </a:r>
+          </a:p>
+          <a:p>
+            <a:r>
+              <a:rPr lang="en-US" sz="2800" dirty="0" smtClean="0">
+                <a:solidFill>
+                  <a:schemeClr val="tx1">
+                    <a:lumMod val="50000"/>
+                    <a:lumOff val="50000"/>
+                  </a:schemeClr>
+                </a:solidFill>
+              </a:rPr>
+              <a:t>Atmosphere can vary from team to team</a:t>
+            </a:r>
+          </a:p>
+          <a:p>
+            <a:pPr lvl="1"/>
+            <a:r>
+              <a:rPr lang="en-US" sz="2400" dirty="0" smtClean="0">
+                <a:solidFill>
+                  <a:schemeClr val="tx1">
+                    <a:lumMod val="50000"/>
+                    <a:lumOff val="50000"/>
+                  </a:schemeClr>
+                </a:solidFill>
+              </a:rPr>
+              <a:t>Some middle management problems</a:t>
+            </a:r>
+          </a:p>
+          <a:p>
+            <a:r>
+              <a:rPr lang="en-US" sz="2800" dirty="0" smtClean="0">
+                <a:solidFill>
+                  <a:schemeClr val="tx1">
+                    <a:lumMod val="50000"/>
+                    <a:lumOff val="50000"/>
+                  </a:schemeClr>
+                </a:solidFill>
+              </a:rPr>
+              <a:t>Hard to stand out in a big company</a:t>
+            </a:r>
+          </a:p>
+          <a:p>
+            <a:pPr lvl="1"/>
+            <a:r>
+              <a:rPr lang="en-US" sz="2400" dirty="0" smtClean="0">
+                <a:solidFill>
+                  <a:schemeClr val="tx1">
+                    <a:lumMod val="50000"/>
+                    <a:lumOff val="50000"/>
+                  </a:schemeClr>
+                </a:solidFill>
+              </a:rPr>
+              <a:t>Better opportunities if willing to relocate</a:t>
+            </a:r>
+            <a:endParaRPr lang="en-US" sz="2400" dirty="0" smtClean="0">
+              <a:solidFill>
+                <a:schemeClr val="tx1">
+                  <a:lumMod val="50000"/>
+                  <a:lumOff val="50000"/>
+                </a:schemeClr>
+              </a:solidFill>
+            </a:endParaRPr>
+          </a:p>
+        </p:txBody>
+      </p:sp>
+      <p:pic>
+        <p:nvPicPr>
+          <p:cNvPr id="2050" name="Picture 2" descr="Image result for microsoft"/>
+          <p:cNvPicPr>
+            <a:picLocks noChangeAspect="1" noChangeArrowheads="1"/>
+          </p:cNvPicPr>
+          <p:nvPr/>
+        </p:nvPicPr>
+        <p:blipFill>
+          <a:blip r:embed="rId2" cstate="print">
+            <a:extLst>
+              <a:ext uri="{28A0092B-C50C-407E-A947-70E740481C1C}">
+                <a14:useLocalDpi xmlns:a14="http://schemas.microsoft.com/office/drawing/2010/main" val="0"/>
+              </a:ext>
+            </a:extLst>
+          </a:blip>
+          <a:srcRect/>
+          <a:stretch>
+            <a:fillRect/>
+          </a:stretch>
+        </p:blipFill>
+        <p:spPr bwMode="auto">
+          <a:xfrm>
+            <a:off x="7672647" y="3352223"/>
+            <a:ext cx="4247803" cy="2832754"/>
+          </a:xfrm>
+          <a:prstGeom prst="rect">
+            <a:avLst/>
+          </a:prstGeom>
+          <a:noFill/>
+          <a:extLst>
+            <a:ext uri="{909E8E84-426E-40DD-AFC4-6F175D3DCCD1}">
+              <a14:hiddenFill xmlns:a14="http://schemas.microsoft.com/office/drawing/2010/main">
+                <a:solidFill>
+                  <a:srgbClr val="FFFFFF"/>
+                </a:solidFill>
+              </a14:hiddenFill>
+            </a:ext>
+          </a:extLst>
+        </p:spPr>
+      </p:pic>
     </p:spTree>
     <p:extLst>
       <p:ext uri="{BB962C8B-B14F-4D97-AF65-F5344CB8AC3E}">
@@ -3093,6 +4172,13 @@
   <p:clrMapOvr>
     <a:masterClrMapping/>
   </p:clrMapOvr>
+  <p:timing>
+    <p:tnLst>
+      <p:par>
+        <p:cTn id="1" dur="indefinite" restart="never" nodeType="tmRoot"/>
+      </p:par>
+    </p:tnLst>
+  </p:timing>
 </p:sld>
 </file>
 
@@ -3129,10 +4215,35 @@
           <a:lstStyle/>
           <a:p>
             <a:r>
-              <a:rPr lang="en-US" dirty="0" smtClean="0"/>
-              <a:t>Types of Jobs</a:t>
-            </a:r>
-            <a:endParaRPr lang="en-US" dirty="0"/>
+              <a:rPr lang="en-US" dirty="0" smtClean="0">
+                <a:solidFill>
+                  <a:schemeClr val="tx1">
+                    <a:lumMod val="50000"/>
+                    <a:lumOff val="50000"/>
+                  </a:schemeClr>
+                </a:solidFill>
+              </a:rPr>
+              <a:t>Types of </a:t>
+            </a:r>
+            <a:r>
+              <a:rPr lang="en-US" dirty="0" smtClean="0">
+                <a:solidFill>
+                  <a:schemeClr val="tx1">
+                    <a:lumMod val="50000"/>
+                    <a:lumOff val="50000"/>
+                  </a:schemeClr>
+                </a:solidFill>
+              </a:rPr>
+              <a:t>Jobs - General</a:t>
+            </a:r>
+            <a:endParaRPr lang="en-US" dirty="0">
+              <a:solidFill>
+                <a:schemeClr val="tx1">
+                  <a:lumMod val="50000"/>
+                  <a:lumOff val="50000"/>
+                </a:schemeClr>
+              </a:solidFill>
+            </a:endParaRPr>
           </a:p>
         </p:txBody>
       </p:sp>
@@ -3146,25 +4257,231 @@
             <p:ph idx="1"/>
           </p:nvPr>
         </p:nvSpPr>
-        <p:spPr/>
-        <p:txBody>
-          <a:bodyPr/>
-          <a:lstStyle/>
-          <a:p>
-            <a:endParaRPr lang="en-US"/>
-          </a:p>
-        </p:txBody>
-      </p:sp>
+        <p:spPr>
+          <a:xfrm>
+            <a:off x="1097280" y="1845733"/>
+            <a:ext cx="10058400" cy="4474855"/>
+          </a:xfrm>
+        </p:spPr>
+        <p:txBody>
+          <a:bodyPr>
+            <a:normAutofit lnSpcReduction="10000"/>
+          </a:bodyPr>
+          <a:lstStyle/>
+          <a:p>
+            <a:r>
+              <a:rPr lang="en-US" sz="2800" dirty="0" smtClean="0">
+                <a:solidFill>
+                  <a:schemeClr val="tx1">
+                    <a:lumMod val="50000"/>
+                    <a:lumOff val="50000"/>
+                  </a:schemeClr>
+                </a:solidFill>
+              </a:rPr>
+              <a:t>Many teams looking for software engineers</a:t>
+            </a:r>
+          </a:p>
+          <a:p>
+            <a:pPr lvl="1"/>
+            <a:r>
+              <a:rPr lang="en-US" sz="2400" dirty="0" smtClean="0">
+                <a:solidFill>
+                  <a:schemeClr val="tx1">
+                    <a:lumMod val="50000"/>
+                    <a:lumOff val="50000"/>
+                  </a:schemeClr>
+                </a:solidFill>
+              </a:rPr>
+              <a:t>Azure, Bing, AI, Office, Gaming, etc.</a:t>
+            </a:r>
+          </a:p>
+          <a:p>
+            <a:pPr lvl="1"/>
+            <a:r>
+              <a:rPr lang="en-US" sz="2400" dirty="0" smtClean="0">
+                <a:solidFill>
+                  <a:schemeClr val="tx1">
+                    <a:lumMod val="50000"/>
+                    <a:lumOff val="50000"/>
+                  </a:schemeClr>
+                </a:solidFill>
+              </a:rPr>
+              <a:t>$94K - $150K</a:t>
+            </a:r>
+          </a:p>
+          <a:p>
+            <a:pPr lvl="1"/>
+            <a:r>
+              <a:rPr lang="en-US" sz="2400" dirty="0" smtClean="0">
+                <a:solidFill>
+                  <a:schemeClr val="tx1">
+                    <a:lumMod val="50000"/>
+                    <a:lumOff val="50000"/>
+                  </a:schemeClr>
+                </a:solidFill>
+              </a:rPr>
+              <a:t>Senior software engineers earn $120K - $160K</a:t>
+            </a:r>
+          </a:p>
+          <a:p>
+            <a:r>
+              <a:rPr lang="en-US" sz="2800" dirty="0" smtClean="0">
+                <a:solidFill>
+                  <a:schemeClr val="tx1">
+                    <a:lumMod val="50000"/>
+                    <a:lumOff val="50000"/>
+                  </a:schemeClr>
+                </a:solidFill>
+              </a:rPr>
+              <a:t>Program Manager</a:t>
+            </a:r>
+          </a:p>
+          <a:p>
+            <a:pPr lvl="1"/>
+            <a:r>
+              <a:rPr lang="en-US" sz="2400" dirty="0" smtClean="0">
+                <a:solidFill>
+                  <a:schemeClr val="tx1">
+                    <a:lumMod val="50000"/>
+                    <a:lumOff val="50000"/>
+                  </a:schemeClr>
+                </a:solidFill>
+              </a:rPr>
+              <a:t>$106K - $171K</a:t>
+            </a:r>
+            <a:endParaRPr lang="en-US" sz="2400" dirty="0" smtClean="0">
+              <a:solidFill>
+                <a:schemeClr val="tx1">
+                  <a:lumMod val="50000"/>
+                  <a:lumOff val="50000"/>
+                </a:schemeClr>
+              </a:solidFill>
+            </a:endParaRPr>
+          </a:p>
+          <a:p>
+            <a:r>
+              <a:rPr lang="en-US" sz="2800" dirty="0" smtClean="0">
+                <a:solidFill>
+                  <a:schemeClr val="tx1">
+                    <a:lumMod val="50000"/>
+                    <a:lumOff val="50000"/>
+                  </a:schemeClr>
+                </a:solidFill>
+              </a:rPr>
+              <a:t>Data &amp; Applied Scientist</a:t>
+            </a:r>
+          </a:p>
+          <a:p>
+            <a:pPr lvl="1"/>
+            <a:r>
+              <a:rPr lang="en-US" sz="2400" dirty="0" smtClean="0">
+                <a:solidFill>
+                  <a:schemeClr val="tx1">
+                    <a:lumMod val="50000"/>
+                    <a:lumOff val="50000"/>
+                  </a:schemeClr>
+                </a:solidFill>
+              </a:rPr>
+              <a:t>$74K - $147K</a:t>
+            </a:r>
+          </a:p>
+          <a:p>
+            <a:r>
+              <a:rPr lang="en-US" sz="2800" dirty="0" smtClean="0">
+                <a:solidFill>
+                  <a:schemeClr val="tx1">
+                    <a:lumMod val="50000"/>
+                    <a:lumOff val="50000"/>
+                  </a:schemeClr>
+                </a:solidFill>
+              </a:rPr>
+              <a:t>UI/UX Design</a:t>
+            </a:r>
+          </a:p>
+          <a:p>
+            <a:pPr lvl="1"/>
+            <a:r>
+              <a:rPr lang="en-US" sz="2400" dirty="0" smtClean="0">
+                <a:solidFill>
+                  <a:schemeClr val="tx1">
+                    <a:lumMod val="50000"/>
+                    <a:lumOff val="50000"/>
+                  </a:schemeClr>
+                </a:solidFill>
+              </a:rPr>
+              <a:t>$85K - $125K</a:t>
+            </a:r>
+          </a:p>
+          <a:p>
+            <a:endParaRPr lang="en-US" sz="2800" dirty="0" smtClean="0">
+              <a:solidFill>
+                <a:schemeClr val="tx1">
+                  <a:lumMod val="50000"/>
+                  <a:lumOff val="50000"/>
+                </a:schemeClr>
+              </a:solidFill>
+            </a:endParaRPr>
+          </a:p>
+        </p:txBody>
+      </p:sp>
+      <p:pic>
+        <p:nvPicPr>
+          <p:cNvPr id="3076" name="Picture 4" descr="Image result for programming job"/>
+          <p:cNvPicPr>
+            <a:picLocks noChangeAspect="1" noChangeArrowheads="1"/>
+          </p:cNvPicPr>
+          <p:nvPr/>
+        </p:nvPicPr>
+        <p:blipFill>
+          <a:blip r:embed="rId2">
+            <a:extLst>
+              <a:ext uri="{28A0092B-C50C-407E-A947-70E740481C1C}">
+                <a14:useLocalDpi xmlns:a14="http://schemas.microsoft.com/office/drawing/2010/main" val="0"/>
+              </a:ext>
+            </a:extLst>
+          </a:blip>
+          <a:srcRect/>
+          <a:stretch>
+            <a:fillRect/>
+          </a:stretch>
+        </p:blipFill>
+        <p:spPr bwMode="auto">
+          <a:xfrm>
+            <a:off x="7486817" y="3169548"/>
+            <a:ext cx="4464551" cy="2980633"/>
+          </a:xfrm>
+          <a:prstGeom prst="rect">
+            <a:avLst/>
+          </a:prstGeom>
+          <a:noFill/>
+          <a:extLst>
+            <a:ext uri="{909E8E84-426E-40DD-AFC4-6F175D3DCCD1}">
+              <a14:hiddenFill xmlns:a14="http://schemas.microsoft.com/office/drawing/2010/main">
+                <a:solidFill>
+                  <a:srgbClr val="FFFFFF"/>
+                </a:solidFill>
+              </a14:hiddenFill>
+            </a:ext>
+          </a:extLst>
+        </p:spPr>
+      </p:pic>
     </p:spTree>
     <p:extLst>
       <p:ext uri="{BB962C8B-B14F-4D97-AF65-F5344CB8AC3E}">
-        <p14:creationId xmlns:p14="http://schemas.microsoft.com/office/powerpoint/2010/main" val="470863863"/>
+        <p14:creationId xmlns:p14="http://schemas.microsoft.com/office/powerpoint/2010/main" val="3360760478"/>
       </p:ext>
     </p:extLst>
   </p:cSld>
   <p:clrMapOvr>
     <a:masterClrMapping/>
   </p:clrMapOvr>
+  <p:timing>
+    <p:tnLst>
+      <p:par>
+        <p:cTn id="1" dur="indefinite" restart="never" nodeType="tmRoot"/>
+      </p:par>
+    </p:tnLst>
+  </p:timing>
 </p:sld>
 </file>
 
@@ -3197,14 +4514,30 @@
         </p:nvSpPr>
         <p:spPr/>
         <p:txBody>
-          <a:bodyPr/>
-          <a:lstStyle/>
-          <a:p>
-            <a:r>
-              <a:rPr lang="en-US" dirty="0" smtClean="0"/>
-              <a:t>Why I want to work for them</a:t>
-            </a:r>
-            <a:endParaRPr lang="en-US" dirty="0"/>
+          <a:bodyPr>
+            <a:normAutofit/>
+          </a:bodyPr>
+          <a:lstStyle/>
+          <a:p>
+            <a:r>
+              <a:rPr lang="en-US" sz="5400" dirty="0" smtClean="0">
+                <a:solidFill>
+                  <a:schemeClr val="tx1">
+                    <a:lumMod val="50000"/>
+                    <a:lumOff val="50000"/>
+                  </a:schemeClr>
+                </a:solidFill>
+              </a:rPr>
+              <a:t>Would I Work There – Pros &amp; Cons</a:t>
+            </a:r>
+            <a:endParaRPr lang="en-US" sz="5400" dirty="0">
+              <a:solidFill>
+                <a:schemeClr val="tx1">
+                  <a:lumMod val="50000"/>
+                  <a:lumOff val="50000"/>
+                </a:schemeClr>
+              </a:solidFill>
+            </a:endParaRPr>
           </a:p>
         </p:txBody>
       </p:sp>
@@ -3220,13 +4553,137 @@
         </p:nvSpPr>
         <p:spPr/>
         <p:txBody>
-          <a:bodyPr/>
-          <a:lstStyle/>
-          <a:p>
-            <a:endParaRPr lang="en-US"/>
-          </a:p>
-        </p:txBody>
-      </p:sp>
+          <a:bodyPr>
+            <a:normAutofit/>
+          </a:bodyPr>
+          <a:lstStyle/>
+          <a:p>
+            <a:r>
+              <a:rPr lang="en-US" sz="2800" dirty="0" smtClean="0">
+                <a:solidFill>
+                  <a:schemeClr val="tx1">
+                    <a:lumMod val="50000"/>
+                    <a:lumOff val="50000"/>
+                  </a:schemeClr>
+                </a:solidFill>
+              </a:rPr>
+              <a:t>Pros</a:t>
+            </a:r>
+          </a:p>
+          <a:p>
+            <a:pPr lvl="1"/>
+            <a:r>
+              <a:rPr lang="en-US" sz="2600" dirty="0" smtClean="0">
+                <a:solidFill>
+                  <a:schemeClr val="tx1">
+                    <a:lumMod val="50000"/>
+                    <a:lumOff val="50000"/>
+                  </a:schemeClr>
+                </a:solidFill>
+              </a:rPr>
+              <a:t>Good income &amp; benefits</a:t>
+            </a:r>
+          </a:p>
+          <a:p>
+            <a:pPr lvl="1"/>
+            <a:r>
+              <a:rPr lang="en-US" sz="2600" dirty="0" smtClean="0">
+                <a:solidFill>
+                  <a:schemeClr val="tx1">
+                    <a:lumMod val="50000"/>
+                    <a:lumOff val="50000"/>
+                  </a:schemeClr>
+                </a:solidFill>
+              </a:rPr>
+              <a:t>Interesting &amp; meaningful work</a:t>
+            </a:r>
+            <a:endParaRPr lang="en-US" sz="2600" dirty="0" smtClean="0">
+              <a:solidFill>
+                <a:schemeClr val="tx1">
+                  <a:lumMod val="50000"/>
+                  <a:lumOff val="50000"/>
+                </a:schemeClr>
+              </a:solidFill>
+            </a:endParaRPr>
+          </a:p>
+          <a:p>
+            <a:r>
+              <a:rPr lang="en-US" sz="2800" dirty="0" smtClean="0">
+                <a:solidFill>
+                  <a:schemeClr val="tx1">
+                    <a:lumMod val="50000"/>
+                    <a:lumOff val="50000"/>
+                  </a:schemeClr>
+                </a:solidFill>
+              </a:rPr>
+              <a:t>Cons</a:t>
+            </a:r>
+          </a:p>
+          <a:p>
+            <a:pPr lvl="1"/>
+            <a:r>
+              <a:rPr lang="en-US" sz="2600" dirty="0" smtClean="0">
+                <a:solidFill>
+                  <a:schemeClr val="tx1">
+                    <a:lumMod val="50000"/>
+                    <a:lumOff val="50000"/>
+                  </a:schemeClr>
+                </a:solidFill>
+              </a:rPr>
+              <a:t>Corporate culture</a:t>
+            </a:r>
+          </a:p>
+          <a:p>
+            <a:pPr lvl="1"/>
+            <a:r>
+              <a:rPr lang="en-US" sz="2600" dirty="0" smtClean="0">
+                <a:solidFill>
+                  <a:schemeClr val="tx1">
+                    <a:lumMod val="50000"/>
+                    <a:lumOff val="50000"/>
+                  </a:schemeClr>
+                </a:solidFill>
+              </a:rPr>
+              <a:t>Hard to stand out &amp; move up</a:t>
+            </a:r>
+          </a:p>
+          <a:p>
+            <a:pPr lvl="1"/>
+            <a:endParaRPr lang="en-US" sz="2600" dirty="0">
+              <a:solidFill>
+                <a:schemeClr val="tx1">
+                  <a:lumMod val="50000"/>
+                  <a:lumOff val="50000"/>
+                </a:schemeClr>
+              </a:solidFill>
+            </a:endParaRPr>
+          </a:p>
+        </p:txBody>
+      </p:sp>
+      <p:pic>
+        <p:nvPicPr>
+          <p:cNvPr id="4" name="Picture 3"/>
+          <p:cNvPicPr>
+            <a:picLocks noChangeAspect="1"/>
+          </p:cNvPicPr>
+          <p:nvPr/>
+        </p:nvPicPr>
+        <p:blipFill>
+          <a:blip r:embed="rId2"/>
+          <a:stretch>
+            <a:fillRect/>
+          </a:stretch>
+        </p:blipFill>
+        <p:spPr>
+          <a:xfrm>
+            <a:off x="6928808" y="1845734"/>
+            <a:ext cx="4226872" cy="4256499"/>
+          </a:xfrm>
+          <a:prstGeom prst="rect">
+            <a:avLst/>
+          </a:prstGeom>
+        </p:spPr>
+      </p:pic>
     </p:spTree>
     <p:extLst>
       <p:ext uri="{BB962C8B-B14F-4D97-AF65-F5344CB8AC3E}">
@@ -3237,6 +4694,13 @@
   <p:clrMapOvr>
     <a:masterClrMapping/>
   </p:clrMapOvr>
+  <p:timing>
+    <p:tnLst>
+      <p:par>
+        <p:cTn id="1" dur="indefinite" restart="never" nodeType="tmRoot"/>
+      </p:par>
+    </p:tnLst>
+  </p:timing>
 </p:sld>
 </file>
 
@@ -3273,10 +4737,35 @@
           <a:lstStyle/>
           <a:p>
             <a:r>
-              <a:rPr lang="en-US" dirty="0" smtClean="0"/>
-              <a:t>What made me interested</a:t>
-            </a:r>
-            <a:endParaRPr lang="en-US" dirty="0"/>
+              <a:rPr lang="en-US" dirty="0" smtClean="0">
+                <a:solidFill>
+                  <a:schemeClr val="tx1">
+                    <a:lumMod val="50000"/>
+                    <a:lumOff val="50000"/>
+                  </a:schemeClr>
+                </a:solidFill>
+              </a:rPr>
+              <a:t>What </a:t>
+            </a:r>
+            <a:r>
+              <a:rPr lang="en-US" dirty="0" smtClean="0">
+                <a:solidFill>
+                  <a:schemeClr val="tx1">
+                    <a:lumMod val="50000"/>
+                    <a:lumOff val="50000"/>
+                  </a:schemeClr>
+                </a:solidFill>
+              </a:rPr>
+              <a:t>Made Me Interested</a:t>
+            </a:r>
+            <a:endParaRPr lang="en-US" dirty="0">
+              <a:solidFill>
+                <a:schemeClr val="tx1">
+                  <a:lumMod val="50000"/>
+                  <a:lumOff val="50000"/>
+                </a:schemeClr>
+              </a:solidFill>
+            </a:endParaRPr>
           </a:p>
         </p:txBody>
       </p:sp>
@@ -3292,13 +4781,94 @@
         </p:nvSpPr>
         <p:spPr/>
         <p:txBody>
-          <a:bodyPr/>
-          <a:lstStyle/>
-          <a:p>
-            <a:endParaRPr lang="en-US"/>
-          </a:p>
-        </p:txBody>
-      </p:sp>
+          <a:bodyPr>
+            <a:normAutofit/>
+          </a:bodyPr>
+          <a:lstStyle/>
+          <a:p>
+            <a:r>
+              <a:rPr lang="en-US" sz="2800" dirty="0" smtClean="0">
+                <a:solidFill>
+                  <a:schemeClr val="tx1">
+                    <a:lumMod val="50000"/>
+                    <a:lumOff val="50000"/>
+                  </a:schemeClr>
+                </a:solidFill>
+              </a:rPr>
+              <a:t>Internship @ Minecraft</a:t>
+            </a:r>
+          </a:p>
+          <a:p>
+            <a:pPr lvl="1"/>
+            <a:r>
+              <a:rPr lang="en-US" sz="2400" dirty="0" smtClean="0">
+                <a:solidFill>
+                  <a:schemeClr val="tx1">
+                    <a:lumMod val="50000"/>
+                    <a:lumOff val="50000"/>
+                  </a:schemeClr>
+                </a:solidFill>
+              </a:rPr>
+              <a:t>First introduction to company &amp; values</a:t>
+            </a:r>
+          </a:p>
+          <a:p>
+            <a:pPr lvl="1"/>
+            <a:r>
+              <a:rPr lang="en-US" sz="2400" dirty="0" smtClean="0">
+                <a:solidFill>
+                  <a:schemeClr val="tx1">
+                    <a:lumMod val="50000"/>
+                    <a:lumOff val="50000"/>
+                  </a:schemeClr>
+                </a:solidFill>
+              </a:rPr>
+              <a:t>Not sure about full-time employment, though</a:t>
+            </a:r>
+          </a:p>
+        </p:txBody>
+      </p:sp>
+      <p:pic>
+        <p:nvPicPr>
+          <p:cNvPr id="4098" name="Picture 2" descr="Image result for microsoft internship summer 2019"/>
+          <p:cNvPicPr>
+            <a:picLocks noChangeAspect="1" noChangeArrowheads="1"/>
+          </p:cNvPicPr>
+          <p:nvPr/>
+        </p:nvPicPr>
+        <p:blipFill>
+          <a:blip r:embed="rId2" cstate="print">
+            <a:extLst>
+              <a:ext uri="{28A0092B-C50C-407E-A947-70E740481C1C}">
+                <a14:useLocalDpi xmlns:a14="http://schemas.microsoft.com/office/drawing/2010/main" val="0"/>
+              </a:ext>
+            </a:extLst>
+          </a:blip>
+          <a:srcRect/>
+          <a:stretch>
+            <a:fillRect/>
+          </a:stretch>
+        </p:blipFill>
+        <p:spPr bwMode="auto">
+          <a:xfrm>
+            <a:off x="7299643" y="3015916"/>
+            <a:ext cx="4705844" cy="3135601"/>
+          </a:xfrm>
+          <a:prstGeom prst="rect">
+            <a:avLst/>
+          </a:prstGeom>
+          <a:noFill/>
+          <a:extLst>
+            <a:ext uri="{909E8E84-426E-40DD-AFC4-6F175D3DCCD1}">
+              <a14:hiddenFill xmlns:a14="http://schemas.microsoft.com/office/drawing/2010/main">
+                <a:solidFill>
+                  <a:srgbClr val="FFFFFF"/>
+                </a:solidFill>
+              </a14:hiddenFill>
+            </a:ext>
+          </a:extLst>
+        </p:spPr>
+      </p:pic>
     </p:spTree>
     <p:extLst>
       <p:ext uri="{BB962C8B-B14F-4D97-AF65-F5344CB8AC3E}">
@@ -3309,6 +4879,13 @@
   <p:clrMapOvr>
     <a:masterClrMapping/>
   </p:clrMapOvr>
+  <p:timing>
+    <p:tnLst>
+      <p:par>
+        <p:cTn id="1" dur="indefinite" restart="never" nodeType="tmRoot"/>
+      </p:par>
+    </p:tnLst>
+  </p:timing>
 </p:sld>
 </file>
 
@@ -3345,10 +4922,24 @@
           <a:lstStyle/>
           <a:p>
             <a:r>
-              <a:rPr lang="en-US" dirty="0" smtClean="0"/>
+              <a:rPr lang="en-US" dirty="0" smtClean="0">
+                <a:solidFill>
+                  <a:schemeClr val="tx1">
+                    <a:lumMod val="50000"/>
+                    <a:lumOff val="50000"/>
+                  </a:schemeClr>
+                </a:solidFill>
+              </a:rPr>
               <a:t>Works Cited</a:t>
             </a:r>
-            <a:endParaRPr lang="en-US" dirty="0"/>
+            <a:endParaRPr lang="en-US" dirty="0">
+              <a:solidFill>
+                <a:schemeClr val="tx1">
+                  <a:lumMod val="50000"/>
+                  <a:lumOff val="50000"/>
+                </a:schemeClr>
+              </a:solidFill>
+            </a:endParaRPr>
           </a:p>
         </p:txBody>
       </p:sp>
@@ -3364,10 +4955,101 @@
         </p:nvSpPr>
         <p:spPr/>
         <p:txBody>
-          <a:bodyPr/>
-          <a:lstStyle/>
-          <a:p>
-            <a:endParaRPr lang="en-US" dirty="0"/>
+          <a:bodyPr>
+            <a:normAutofit/>
+          </a:bodyPr>
+          <a:lstStyle/>
+          <a:p>
+            <a:r>
+              <a:rPr lang="en-US" sz="2800" dirty="0">
+                <a:solidFill>
+                  <a:schemeClr val="tx1">
+                    <a:lumMod val="50000"/>
+                    <a:lumOff val="50000"/>
+                  </a:schemeClr>
+                </a:solidFill>
+              </a:rPr>
+              <a:t>https://</a:t>
+            </a:r>
+            <a:r>
+              <a:rPr lang="en-US" sz="2800" dirty="0" smtClean="0">
+                <a:solidFill>
+                  <a:schemeClr val="tx1">
+                    <a:lumMod val="50000"/>
+                    <a:lumOff val="50000"/>
+                  </a:schemeClr>
+                </a:solidFill>
+              </a:rPr>
+              <a:t>careers.microsoft.com/us/en/culture</a:t>
+            </a:r>
+          </a:p>
+          <a:p>
+            <a:r>
+              <a:rPr lang="en-US" sz="2800" dirty="0">
+                <a:solidFill>
+                  <a:schemeClr val="tx1">
+                    <a:lumMod val="50000"/>
+                    <a:lumOff val="50000"/>
+                  </a:schemeClr>
+                </a:solidFill>
+              </a:rPr>
+              <a:t>https://</a:t>
+            </a:r>
+            <a:r>
+              <a:rPr lang="en-US" sz="2800" dirty="0" smtClean="0">
+                <a:solidFill>
+                  <a:schemeClr val="tx1">
+                    <a:lumMod val="50000"/>
+                    <a:lumOff val="50000"/>
+                  </a:schemeClr>
+                </a:solidFill>
+              </a:rPr>
+              <a:t>www.glassdoor.com/Reviews/Microsoft-Reviews-E1651.htm</a:t>
+            </a:r>
+          </a:p>
+          <a:p>
+            <a:r>
+              <a:rPr lang="en-US" sz="2800" dirty="0">
+                <a:solidFill>
+                  <a:schemeClr val="tx1">
+                    <a:lumMod val="50000"/>
+                    <a:lumOff val="50000"/>
+                  </a:schemeClr>
+                </a:solidFill>
+              </a:rPr>
+              <a:t>https://</a:t>
+            </a:r>
+            <a:r>
+              <a:rPr lang="en-US" sz="2800" dirty="0" smtClean="0">
+                <a:solidFill>
+                  <a:schemeClr val="tx1">
+                    <a:lumMod val="50000"/>
+                    <a:lumOff val="50000"/>
+                  </a:schemeClr>
+                </a:solidFill>
+              </a:rPr>
+              <a:t>www.indeed.com/cmp/Microsoft/reviews</a:t>
+            </a:r>
+          </a:p>
+          <a:p>
+            <a:endParaRPr lang="en-US" sz="2800" dirty="0" smtClean="0">
+              <a:solidFill>
+                <a:schemeClr val="tx1">
+                  <a:lumMod val="50000"/>
+                  <a:lumOff val="50000"/>
+                </a:schemeClr>
+              </a:solidFill>
+            </a:endParaRPr>
+          </a:p>
+          <a:p>
+            <a:endParaRPr lang="en-US" sz="2800" dirty="0">
+              <a:solidFill>
+                <a:schemeClr val="tx1">
+                  <a:lumMod val="50000"/>
+                  <a:lumOff val="50000"/>
+                </a:schemeClr>
+              </a:solidFill>
+            </a:endParaRPr>
           </a:p>
         </p:txBody>
       </p:sp>
@@ -3381,13 +5063,20 @@
   <p:clrMapOvr>
     <a:masterClrMapping/>
   </p:clrMapOvr>
+  <p:timing>
+    <p:tnLst>
+      <p:par>
+        <p:cTn id="1" dur="indefinite" restart="never" nodeType="tmRoot"/>
+      </p:par>
+    </p:tnLst>
+  </p:timing>
 </p:sld>
 </file>
 
 <file path=ppt/theme/theme1.xml><?xml version="1.0" encoding="utf-8"?>
-<a:theme xmlns:a="http://schemas.openxmlformats.org/drawingml/2006/main" name="Office Theme">
+<a:theme xmlns:a="http://schemas.openxmlformats.org/drawingml/2006/main" name="Retrospect">
   <a:themeElements>
-    <a:clrScheme name="Office">
+    <a:clrScheme name="Retrospect">
       <a:dk1>
         <a:sysClr val="windowText" lastClr="000000"/>
       </a:dk1>
@@ -3395,44 +5084,44 @@
         <a:sysClr val="window" lastClr="FFFFFF"/>
       </a:lt1>
       <a:dk2>
-        <a:srgbClr val="44546A"/>
+        <a:srgbClr val="344068"/>
       </a:dk2>
       <a:lt2>
-        <a:srgbClr val="E7E6E6"/>
+        <a:srgbClr val="D9E0E6"/>
       </a:lt2>
       <a:accent1>
-        <a:srgbClr val="5B9BD5"/>
+        <a:srgbClr val="1CADE4"/>
       </a:accent1>
       <a:accent2>
-        <a:srgbClr val="ED7D31"/>
+        <a:srgbClr val="2683C6"/>
       </a:accent2>
       <a:accent3>
-        <a:srgbClr val="A5A5A5"/>
+        <a:srgbClr val="28C4CC"/>
       </a:accent3>
       <a:accent4>
-        <a:srgbClr val="FFC000"/>
+        <a:srgbClr val="42BA97"/>
       </a:accent4>
       <a:accent5>
-        <a:srgbClr val="4472C4"/>
+        <a:srgbClr val="3E8853"/>
       </a:accent5>
       <a:accent6>
-        <a:srgbClr val="70AD47"/>
+        <a:srgbClr val="62A39F"/>
       </a:accent6>
       <a:hlink>
-        <a:srgbClr val="0563C1"/>
+        <a:srgbClr val="6EAC1C"/>
       </a:hlink>
       <a:folHlink>
-        <a:srgbClr val="954F72"/>
+        <a:srgbClr val="B26B02"/>
       </a:folHlink>
     </a:clrScheme>
-    <a:fontScheme name="Office">
+    <a:fontScheme name="Retrospect">
       <a:majorFont>
         <a:latin typeface="Calibri Light" panose="020F0302020204030204"/>
         <a:ea typeface=""/>
         <a:cs typeface=""/>
-        <a:font script="Jpan" typeface="游ゴシック Light"/>
+        <a:font script="Jpan" typeface="ＭＳ Ｐゴシック"/>
         <a:font script="Hang" typeface="맑은 고딕"/>
-        <a:font script="Hans" typeface="等线 Light"/>
+        <a:font script="Hans" typeface="宋体"/>
         <a:font script="Hant" typeface="新細明體"/>
         <a:font script="Arab" typeface="Times New Roman"/>
         <a:font script="Hebr" typeface="Times New Roman"/>
@@ -3465,9 +5154,9 @@
         <a:latin typeface="Calibri" panose="020F0502020204030204"/>
         <a:ea typeface=""/>
         <a:cs typeface=""/>
-        <a:font script="Jpan" typeface="游ゴシック"/>
+        <a:font script="Jpan" typeface="ＭＳ Ｐゴシック"/>
         <a:font script="Hang" typeface="맑은 고딕"/>
-        <a:font script="Hans" typeface="等线"/>
+        <a:font script="Hans" typeface="宋体"/>
         <a:font script="Hant" typeface="新細明體"/>
         <a:font script="Arab" typeface="Arial"/>
         <a:font script="Hebr" typeface="Arial"/>
@@ -3497,7 +5186,7 @@
         <a:font script="Geor" typeface="Sylfaen"/>
       </a:minorFont>
     </a:fontScheme>
-    <a:fmtScheme name="Office">
+    <a:fmtScheme name="Retrospect">
       <a:fillStyleLst>
         <a:solidFill>
           <a:schemeClr val="phClr"/>
@@ -3506,76 +5195,81 @@
           <a:gsLst>
             <a:gs pos="0">
               <a:schemeClr val="phClr">
-                <a:lumMod val="110000"/>
-                <a:satMod val="105000"/>
-                <a:tint val="67000"/>
+                <a:tint val="65000"/>
+                <a:shade val="92000"/>
+                <a:satMod val="130000"/>
               </a:schemeClr>
             </a:gs>
-            <a:gs pos="50000">
+            <a:gs pos="45000">
               <a:schemeClr val="phClr">
-                <a:lumMod val="105000"/>
-                <a:satMod val="103000"/>
-                <a:tint val="73000"/>
+                <a:tint val="60000"/>
+                <a:shade val="99000"/>
+                <a:satMod val="120000"/>
               </a:schemeClr>
             </a:gs>
             <a:gs pos="100000">
               <a:schemeClr val="phClr">
-                <a:lumMod val="105000"/>
-                <a:satMod val="109000"/>
-                <a:tint val="81000"/>
+                <a:tint val="55000"/>
+                <a:satMod val="140000"/>
               </a:schemeClr>
             </a:gs>
           </a:gsLst>
-          <a:lin ang="5400000" scaled="0"/>
+          <a:path path="circle">
+            <a:fillToRect l="100000" t="100000" r="100000" b="100000"/>
+          </a:path>
         </a:gradFill>
         <a:gradFill rotWithShape="1">
           <a:gsLst>
             <a:gs pos="0">
               <a:schemeClr val="phClr">
-                <a:satMod val="103000"/>
-                <a:lumMod val="102000"/>
-                <a:tint val="94000"/>
+                <a:shade val="85000"/>
+                <a:satMod val="130000"/>
               </a:schemeClr>
             </a:gs>
-            <a:gs pos="50000">
+            <a:gs pos="34000">
               <a:schemeClr val="phClr">
-                <a:satMod val="110000"/>
-                <a:lumMod val="100000"/>
-                <a:shade val="100000"/>
+                <a:shade val="87000"/>
+                <a:satMod val="125000"/>
+              </a:schemeClr>
+            </a:gs>
+            <a:gs pos="70000">
+              <a:schemeClr val="phClr">
+                <a:tint val="100000"/>
+                <a:shade val="90000"/>
+                <a:satMod val="130000"/>
               </a:schemeClr>
             </a:gs>
             <a:gs pos="100000">
               <a:schemeClr val="phClr">
-                <a:lumMod val="99000"/>
-                <a:satMod val="120000"/>
-                <a:shade val="78000"/>
+                <a:tint val="100000"/>
+                <a:shade val="100000"/>
+                <a:satMod val="110000"/>
               </a:schemeClr>
             </a:gs>
           </a:gsLst>
-          <a:lin ang="5400000" scaled="0"/>
+          <a:path path="circle">
+            <a:fillToRect l="100000" t="100000" r="100000" b="100000"/>
+          </a:path>
         </a:gradFill>
       </a:fillStyleLst>
       <a:lnStyleLst>
-        <a:ln w="6350" cap="flat" cmpd="sng" algn="ctr">
-          <a:solidFill>
-            <a:schemeClr val="phClr"/>
-          </a:solidFill>
-          <a:prstDash val="solid"/>
-          <a:miter lim="800000"/>
-        </a:ln>
         <a:ln w="12700" cap="flat" cmpd="sng" algn="ctr">
           <a:solidFill>
             <a:schemeClr val="phClr"/>
           </a:solidFill>
           <a:prstDash val="solid"/>
-          <a:miter lim="800000"/>
         </a:ln>
-        <a:ln w="19050" cap="flat" cmpd="sng" algn="ctr">
+        <a:ln w="15875" cap="flat" cmpd="sng" algn="ctr">
           <a:solidFill>
             <a:schemeClr val="phClr"/>
           </a:solidFill>
           <a:prstDash val="solid"/>
-          <a:miter lim="800000"/>
+        </a:ln>
+        <a:ln w="25400" cap="flat" cmpd="sng" algn="ctr">
+          <a:solidFill>
+            <a:schemeClr val="phClr"/>
+          </a:solidFill>
+          <a:prstDash val="solid"/>
         </a:ln>
       </a:lnStyleLst>
       <a:effectStyleLst>
@@ -3583,16 +5277,33 @@
           <a:effectLst/>
         </a:effectStyle>
         <a:effectStyle>
-          <a:effectLst/>
+          <a:effectLst>
+            <a:outerShdw blurRad="38100" dist="25400" dir="2700000" algn="br" rotWithShape="0">
+              <a:srgbClr val="000000">
+                <a:alpha val="60000"/>
+              </a:srgbClr>
+            </a:outerShdw>
+          </a:effectLst>
         </a:effectStyle>
         <a:effectStyle>
           <a:effectLst>
-            <a:outerShdw blurRad="57150" dist="19050" dir="5400000" algn="ctr" rotWithShape="0">
+            <a:outerShdw blurRad="44450" dist="25400" dir="2700000" algn="br" rotWithShape="0">
               <a:srgbClr val="000000">
-                <a:alpha val="63000"/>
+                <a:alpha val="60000"/>
               </a:srgbClr>
             </a:outerShdw>
           </a:effectLst>
+          <a:scene3d>
+            <a:camera prst="orthographicFront">
+              <a:rot lat="0" lon="0" rev="0"/>
+            </a:camera>
+            <a:lightRig rig="threePt" dir="t">
+              <a:rot lat="0" lon="0" rev="19800000"/>
+            </a:lightRig>
+          </a:scene3d>
+          <a:sp3d prstMaterial="flat">
+            <a:bevelT w="25400" h="31750"/>
+          </a:sp3d>
         </a:effectStyle>
       </a:effectStyleLst>
       <a:bgFillStyleLst>
@@ -3601,36 +5312,36 @@
         </a:solidFill>
         <a:solidFill>
           <a:schemeClr val="phClr">
-            <a:tint val="95000"/>
-            <a:satMod val="170000"/>
+            <a:tint val="90000"/>
+            <a:shade val="97000"/>
+            <a:satMod val="130000"/>
           </a:schemeClr>
         </a:solidFill>
         <a:gradFill rotWithShape="1">
           <a:gsLst>
             <a:gs pos="0">
               <a:schemeClr val="phClr">
-                <a:tint val="93000"/>
-                <a:satMod val="150000"/>
-                <a:shade val="98000"/>
-                <a:lumMod val="102000"/>
+                <a:tint val="96000"/>
+                <a:shade val="99000"/>
+                <a:satMod val="140000"/>
               </a:schemeClr>
             </a:gs>
-            <a:gs pos="50000">
+            <a:gs pos="65000">
               <a:schemeClr val="phClr">
-                <a:tint val="98000"/>
+                <a:tint val="100000"/>
+                <a:shade val="80000"/>
                 <a:satMod val="130000"/>
-                <a:shade val="90000"/>
-                <a:lumMod val="103000"/>
               </a:schemeClr>
             </a:gs>
             <a:gs pos="100000">
               <a:schemeClr val="phClr">
-                <a:shade val="63000"/>
+                <a:tint val="100000"/>
+                <a:shade val="48000"/>
                 <a:satMod val="120000"/>
               </a:schemeClr>
             </a:gs>
           </a:gsLst>
-          <a:lin ang="5400000" scaled="0"/>
+          <a:lin ang="16200000" scaled="0"/>
         </a:gradFill>
       </a:bgFillStyleLst>
     </a:fmtScheme>
@@ -3639,7 +5350,7 @@
   <a:extraClrSchemeLst/>
   <a:extLst>
     <a:ext uri="{05A4C25C-085E-4340-85A3-A5531E510DB2}">
-      <thm15:themeFamily xmlns:thm15="http://schemas.microsoft.com/office/thememl/2012/main" name="Office Theme" id="{62F939B6-93AF-4DB8-9C6B-D6C7DFDC589F}" vid="{4A3C46E8-61CC-4603-A589-7422A47A8E4A}"/>
+      <thm15:themeFamily xmlns:thm15="http://schemas.microsoft.com/office/thememl/2012/main" name="Retrospect" id="{5F128B03-DCCA-4EEB-AB3B-CF2899314A46}" vid="{9CC26709-368C-4D72-9060-94E5B3FF3CD6}"/>
     </a:ext>
   </a:extLst>
 </a:theme>

</xml_diff>

<commit_message>
updated zombie dice w/ pointer stuffs
</commit_message>
<xml_diff>
--- a/GameCareer_Microsoft.pptx
+++ b/GameCareer_Microsoft.pptx
@@ -4110,14 +4110,6 @@
               </a:rPr>
               <a:t>Better opportunities if willing to relocate</a:t>
             </a:r>
-            <a:endParaRPr lang="en-US" sz="2400" dirty="0" smtClean="0">
-              <a:solidFill>
-                <a:schemeClr val="tx1">
-                  <a:lumMod val="50000"/>
-                  <a:lumOff val="50000"/>
-                </a:schemeClr>
-              </a:solidFill>
-            </a:endParaRPr>
           </a:p>
         </p:txBody>
       </p:sp>
@@ -4223,18 +4215,7 @@
                   </a:schemeClr>
                 </a:solidFill>
               </a:rPr>
-              <a:t>Types of </a:t>
-            </a:r>
-            <a:r>
-              <a:rPr lang="en-US" dirty="0" smtClean="0">
-                <a:solidFill>
-                  <a:schemeClr val="tx1">
-                    <a:lumMod val="50000"/>
-                    <a:lumOff val="50000"/>
-                  </a:schemeClr>
-                </a:solidFill>
-              </a:rPr>
-              <a:t>Jobs - General</a:t>
+              <a:t>Types of Jobs - General</a:t>
             </a:r>
             <a:endParaRPr lang="en-US" dirty="0">
               <a:solidFill>
@@ -4349,14 +4330,6 @@
               </a:rPr>
               <a:t>$106K - $171K</a:t>
             </a:r>
-            <a:endParaRPr lang="en-US" sz="2400" dirty="0" smtClean="0">
-              <a:solidFill>
-                <a:schemeClr val="tx1">
-                  <a:lumMod val="50000"/>
-                  <a:lumOff val="50000"/>
-                </a:schemeClr>
-              </a:solidFill>
-            </a:endParaRPr>
           </a:p>
           <a:p>
             <a:r>
@@ -4597,14 +4570,6 @@
               </a:rPr>
               <a:t>Interesting &amp; meaningful work</a:t>
             </a:r>
-            <a:endParaRPr lang="en-US" sz="2600" dirty="0" smtClean="0">
-              <a:solidFill>
-                <a:schemeClr val="tx1">
-                  <a:lumMod val="50000"/>
-                  <a:lumOff val="50000"/>
-                </a:schemeClr>
-              </a:solidFill>
-            </a:endParaRPr>
           </a:p>
           <a:p>
             <a:r>
@@ -4745,18 +4710,7 @@
                   </a:schemeClr>
                 </a:solidFill>
               </a:rPr>
-              <a:t>What </a:t>
-            </a:r>
-            <a:r>
-              <a:rPr lang="en-US" dirty="0" smtClean="0">
-                <a:solidFill>
-                  <a:schemeClr val="tx1">
-                    <a:lumMod val="50000"/>
-                    <a:lumOff val="50000"/>
-                  </a:schemeClr>
-                </a:solidFill>
-              </a:rPr>
-              <a:t>Made Me Interested</a:t>
+              <a:t>What Made Me Interested</a:t>
             </a:r>
             <a:endParaRPr lang="en-US" dirty="0">
               <a:solidFill>
@@ -4823,8 +4777,38 @@
                   </a:schemeClr>
                 </a:solidFill>
               </a:rPr>
-              <a:t>Not sure about full-time employment, though</a:t>
-            </a:r>
+              <a:t>Not sure about full-time employment</a:t>
+            </a:r>
+            <a:r>
+              <a:rPr lang="en-US" sz="2400" smtClean="0">
+                <a:solidFill>
+                  <a:schemeClr val="tx1">
+                    <a:lumMod val="50000"/>
+                    <a:lumOff val="50000"/>
+                  </a:schemeClr>
+                </a:solidFill>
+              </a:rPr>
+              <a:t>, </a:t>
+            </a:r>
+            <a:r>
+              <a:rPr lang="en-US" sz="2400" smtClean="0">
+                <a:solidFill>
+                  <a:schemeClr val="tx1">
+                    <a:lumMod val="50000"/>
+                    <a:lumOff val="50000"/>
+                  </a:schemeClr>
+                </a:solidFill>
+              </a:rPr>
+              <a:t>though</a:t>
+            </a:r>
+            <a:endParaRPr lang="en-US" sz="2400" dirty="0" smtClean="0">
+              <a:solidFill>
+                <a:schemeClr val="tx1">
+                  <a:lumMod val="50000"/>
+                  <a:lumOff val="50000"/>
+                </a:schemeClr>
+              </a:solidFill>
+            </a:endParaRPr>
           </a:p>
         </p:txBody>
       </p:sp>

</xml_diff>